<commit_message>
Update Determining which variables contribute to likely hood of.pptx
</commit_message>
<xml_diff>
--- a/midterm_project/Determining which variables contribute to likely hood of.pptx
+++ b/midterm_project/Determining which variables contribute to likely hood of.pptx
@@ -14,13 +14,13 @@
     <p:sldId id="267" r:id="rId8"/>
     <p:sldId id="276" r:id="rId9"/>
     <p:sldId id="264" r:id="rId10"/>
-    <p:sldId id="261" r:id="rId11"/>
-    <p:sldId id="271" r:id="rId12"/>
-    <p:sldId id="272" r:id="rId13"/>
-    <p:sldId id="273" r:id="rId14"/>
-    <p:sldId id="274" r:id="rId15"/>
-    <p:sldId id="275" r:id="rId16"/>
-    <p:sldId id="268" r:id="rId17"/>
+    <p:sldId id="272" r:id="rId11"/>
+    <p:sldId id="273" r:id="rId12"/>
+    <p:sldId id="278" r:id="rId13"/>
+    <p:sldId id="274" r:id="rId14"/>
+    <p:sldId id="275" r:id="rId15"/>
+    <p:sldId id="268" r:id="rId16"/>
+    <p:sldId id="279" r:id="rId17"/>
   </p:sldIdLst>
   <p:sldSz cx="12192000" cy="6858000"/>
   <p:notesSz cx="6858000" cy="9144000"/>
@@ -149,7 +149,7 @@
           <p:cNvPr id="2" name="Title 1">
             <a:extLst>
               <a:ext uri="{FF2B5EF4-FFF2-40B4-BE49-F238E27FC236}">
-                <a16:creationId xmlns:a16="http://schemas.microsoft.com/office/drawing/2014/main" xmlns="" id="{FB25774F-A20A-4FC2-ACE7-42D83D27E4B6}"/>
+                <a16:creationId xmlns="" xmlns:a16="http://schemas.microsoft.com/office/drawing/2014/main" id="{FB25774F-A20A-4FC2-ACE7-42D83D27E4B6}"/>
               </a:ext>
             </a:extLst>
           </p:cNvPr>
@@ -186,7 +186,7 @@
           <p:cNvPr id="3" name="Subtitle 2">
             <a:extLst>
               <a:ext uri="{FF2B5EF4-FFF2-40B4-BE49-F238E27FC236}">
-                <a16:creationId xmlns:a16="http://schemas.microsoft.com/office/drawing/2014/main" xmlns="" id="{72B84185-3944-43B7-A2BD-4BD59E26A699}"/>
+                <a16:creationId xmlns="" xmlns:a16="http://schemas.microsoft.com/office/drawing/2014/main" id="{72B84185-3944-43B7-A2BD-4BD59E26A699}"/>
               </a:ext>
             </a:extLst>
           </p:cNvPr>
@@ -256,7 +256,7 @@
           <p:cNvPr id="4" name="Date Placeholder 3">
             <a:extLst>
               <a:ext uri="{FF2B5EF4-FFF2-40B4-BE49-F238E27FC236}">
-                <a16:creationId xmlns:a16="http://schemas.microsoft.com/office/drawing/2014/main" xmlns="" id="{AD5207E0-3F19-4992-A877-FAB40004E2CE}"/>
+                <a16:creationId xmlns="" xmlns:a16="http://schemas.microsoft.com/office/drawing/2014/main" id="{AD5207E0-3F19-4992-A877-FAB40004E2CE}"/>
               </a:ext>
             </a:extLst>
           </p:cNvPr>
@@ -285,7 +285,7 @@
           <p:cNvPr id="5" name="Footer Placeholder 4">
             <a:extLst>
               <a:ext uri="{FF2B5EF4-FFF2-40B4-BE49-F238E27FC236}">
-                <a16:creationId xmlns:a16="http://schemas.microsoft.com/office/drawing/2014/main" xmlns="" id="{5CF1C43B-2ECD-4DA3-B761-AE1EB261FC98}"/>
+                <a16:creationId xmlns="" xmlns:a16="http://schemas.microsoft.com/office/drawing/2014/main" id="{5CF1C43B-2ECD-4DA3-B761-AE1EB261FC98}"/>
               </a:ext>
             </a:extLst>
           </p:cNvPr>
@@ -310,7 +310,7 @@
           <p:cNvPr id="6" name="Slide Number Placeholder 5">
             <a:extLst>
               <a:ext uri="{FF2B5EF4-FFF2-40B4-BE49-F238E27FC236}">
-                <a16:creationId xmlns:a16="http://schemas.microsoft.com/office/drawing/2014/main" xmlns="" id="{A3FE33B1-9CCA-4199-9E0D-E2F8D7D1C18B}"/>
+                <a16:creationId xmlns="" xmlns:a16="http://schemas.microsoft.com/office/drawing/2014/main" id="{A3FE33B1-9CCA-4199-9E0D-E2F8D7D1C18B}"/>
               </a:ext>
             </a:extLst>
           </p:cNvPr>
@@ -369,7 +369,7 @@
           <p:cNvPr id="2" name="Title 1">
             <a:extLst>
               <a:ext uri="{FF2B5EF4-FFF2-40B4-BE49-F238E27FC236}">
-                <a16:creationId xmlns:a16="http://schemas.microsoft.com/office/drawing/2014/main" xmlns="" id="{76DFED00-6D4F-499A-8B36-1C90EC692F3E}"/>
+                <a16:creationId xmlns="" xmlns:a16="http://schemas.microsoft.com/office/drawing/2014/main" id="{76DFED00-6D4F-499A-8B36-1C90EC692F3E}"/>
               </a:ext>
             </a:extLst>
           </p:cNvPr>
@@ -397,7 +397,7 @@
           <p:cNvPr id="3" name="Vertical Text Placeholder 2">
             <a:extLst>
               <a:ext uri="{FF2B5EF4-FFF2-40B4-BE49-F238E27FC236}">
-                <a16:creationId xmlns:a16="http://schemas.microsoft.com/office/drawing/2014/main" xmlns="" id="{99B0F380-2436-4CD3-8DAE-75E8B44B3A41}"/>
+                <a16:creationId xmlns="" xmlns:a16="http://schemas.microsoft.com/office/drawing/2014/main" id="{99B0F380-2436-4CD3-8DAE-75E8B44B3A41}"/>
               </a:ext>
             </a:extLst>
           </p:cNvPr>
@@ -454,7 +454,7 @@
           <p:cNvPr id="4" name="Date Placeholder 3">
             <a:extLst>
               <a:ext uri="{FF2B5EF4-FFF2-40B4-BE49-F238E27FC236}">
-                <a16:creationId xmlns:a16="http://schemas.microsoft.com/office/drawing/2014/main" xmlns="" id="{4364A7C8-657B-45E8-B865-A0E3CEA71F31}"/>
+                <a16:creationId xmlns="" xmlns:a16="http://schemas.microsoft.com/office/drawing/2014/main" id="{4364A7C8-657B-45E8-B865-A0E3CEA71F31}"/>
               </a:ext>
             </a:extLst>
           </p:cNvPr>
@@ -483,7 +483,7 @@
           <p:cNvPr id="5" name="Footer Placeholder 4">
             <a:extLst>
               <a:ext uri="{FF2B5EF4-FFF2-40B4-BE49-F238E27FC236}">
-                <a16:creationId xmlns:a16="http://schemas.microsoft.com/office/drawing/2014/main" xmlns="" id="{88F42CB0-6AD7-441E-94E6-2BF22230D434}"/>
+                <a16:creationId xmlns="" xmlns:a16="http://schemas.microsoft.com/office/drawing/2014/main" id="{88F42CB0-6AD7-441E-94E6-2BF22230D434}"/>
               </a:ext>
             </a:extLst>
           </p:cNvPr>
@@ -508,7 +508,7 @@
           <p:cNvPr id="6" name="Slide Number Placeholder 5">
             <a:extLst>
               <a:ext uri="{FF2B5EF4-FFF2-40B4-BE49-F238E27FC236}">
-                <a16:creationId xmlns:a16="http://schemas.microsoft.com/office/drawing/2014/main" xmlns="" id="{19F7CF98-4D8C-4AD0-B045-CE7C8805B171}"/>
+                <a16:creationId xmlns="" xmlns:a16="http://schemas.microsoft.com/office/drawing/2014/main" id="{19F7CF98-4D8C-4AD0-B045-CE7C8805B171}"/>
               </a:ext>
             </a:extLst>
           </p:cNvPr>
@@ -567,7 +567,7 @@
           <p:cNvPr id="2" name="Vertical Title 1">
             <a:extLst>
               <a:ext uri="{FF2B5EF4-FFF2-40B4-BE49-F238E27FC236}">
-                <a16:creationId xmlns:a16="http://schemas.microsoft.com/office/drawing/2014/main" xmlns="" id="{B3806EFC-7D43-48BF-97F9-F513300571BE}"/>
+                <a16:creationId xmlns="" xmlns:a16="http://schemas.microsoft.com/office/drawing/2014/main" id="{B3806EFC-7D43-48BF-97F9-F513300571BE}"/>
               </a:ext>
             </a:extLst>
           </p:cNvPr>
@@ -600,7 +600,7 @@
           <p:cNvPr id="3" name="Vertical Text Placeholder 2">
             <a:extLst>
               <a:ext uri="{FF2B5EF4-FFF2-40B4-BE49-F238E27FC236}">
-                <a16:creationId xmlns:a16="http://schemas.microsoft.com/office/drawing/2014/main" xmlns="" id="{0DF19E8F-90A4-426A-A10E-4A2B18A18292}"/>
+                <a16:creationId xmlns="" xmlns:a16="http://schemas.microsoft.com/office/drawing/2014/main" id="{0DF19E8F-90A4-426A-A10E-4A2B18A18292}"/>
               </a:ext>
             </a:extLst>
           </p:cNvPr>
@@ -662,7 +662,7 @@
           <p:cNvPr id="4" name="Date Placeholder 3">
             <a:extLst>
               <a:ext uri="{FF2B5EF4-FFF2-40B4-BE49-F238E27FC236}">
-                <a16:creationId xmlns:a16="http://schemas.microsoft.com/office/drawing/2014/main" xmlns="" id="{B956B393-A0A9-4CC3-BE36-036FC0070980}"/>
+                <a16:creationId xmlns="" xmlns:a16="http://schemas.microsoft.com/office/drawing/2014/main" id="{B956B393-A0A9-4CC3-BE36-036FC0070980}"/>
               </a:ext>
             </a:extLst>
           </p:cNvPr>
@@ -691,7 +691,7 @@
           <p:cNvPr id="5" name="Footer Placeholder 4">
             <a:extLst>
               <a:ext uri="{FF2B5EF4-FFF2-40B4-BE49-F238E27FC236}">
-                <a16:creationId xmlns:a16="http://schemas.microsoft.com/office/drawing/2014/main" xmlns="" id="{DEC491FE-35A3-407C-A01A-80C25D9D28F4}"/>
+                <a16:creationId xmlns="" xmlns:a16="http://schemas.microsoft.com/office/drawing/2014/main" id="{DEC491FE-35A3-407C-A01A-80C25D9D28F4}"/>
               </a:ext>
             </a:extLst>
           </p:cNvPr>
@@ -716,7 +716,7 @@
           <p:cNvPr id="6" name="Slide Number Placeholder 5">
             <a:extLst>
               <a:ext uri="{FF2B5EF4-FFF2-40B4-BE49-F238E27FC236}">
-                <a16:creationId xmlns:a16="http://schemas.microsoft.com/office/drawing/2014/main" xmlns="" id="{EADB9B4B-9171-4041-976D-32434C4A16FE}"/>
+                <a16:creationId xmlns="" xmlns:a16="http://schemas.microsoft.com/office/drawing/2014/main" id="{EADB9B4B-9171-4041-976D-32434C4A16FE}"/>
               </a:ext>
             </a:extLst>
           </p:cNvPr>
@@ -775,7 +775,7 @@
           <p:cNvPr id="2" name="Title 1">
             <a:extLst>
               <a:ext uri="{FF2B5EF4-FFF2-40B4-BE49-F238E27FC236}">
-                <a16:creationId xmlns:a16="http://schemas.microsoft.com/office/drawing/2014/main" xmlns="" id="{3D01F5FA-441A-4F59-A005-9AB0686C0469}"/>
+                <a16:creationId xmlns="" xmlns:a16="http://schemas.microsoft.com/office/drawing/2014/main" id="{3D01F5FA-441A-4F59-A005-9AB0686C0469}"/>
               </a:ext>
             </a:extLst>
           </p:cNvPr>
@@ -803,7 +803,7 @@
           <p:cNvPr id="3" name="Content Placeholder 2">
             <a:extLst>
               <a:ext uri="{FF2B5EF4-FFF2-40B4-BE49-F238E27FC236}">
-                <a16:creationId xmlns:a16="http://schemas.microsoft.com/office/drawing/2014/main" xmlns="" id="{CB223984-009F-4CAF-8FE1-9A30FF88D8E0}"/>
+                <a16:creationId xmlns="" xmlns:a16="http://schemas.microsoft.com/office/drawing/2014/main" id="{CB223984-009F-4CAF-8FE1-9A30FF88D8E0}"/>
               </a:ext>
             </a:extLst>
           </p:cNvPr>
@@ -860,7 +860,7 @@
           <p:cNvPr id="4" name="Date Placeholder 3">
             <a:extLst>
               <a:ext uri="{FF2B5EF4-FFF2-40B4-BE49-F238E27FC236}">
-                <a16:creationId xmlns:a16="http://schemas.microsoft.com/office/drawing/2014/main" xmlns="" id="{0B2AD834-02FE-4911-BC3B-BC1874B817CD}"/>
+                <a16:creationId xmlns="" xmlns:a16="http://schemas.microsoft.com/office/drawing/2014/main" id="{0B2AD834-02FE-4911-BC3B-BC1874B817CD}"/>
               </a:ext>
             </a:extLst>
           </p:cNvPr>
@@ -889,7 +889,7 @@
           <p:cNvPr id="5" name="Footer Placeholder 4">
             <a:extLst>
               <a:ext uri="{FF2B5EF4-FFF2-40B4-BE49-F238E27FC236}">
-                <a16:creationId xmlns:a16="http://schemas.microsoft.com/office/drawing/2014/main" xmlns="" id="{30FA8F9C-2F2A-440F-88A2-3575533817C0}"/>
+                <a16:creationId xmlns="" xmlns:a16="http://schemas.microsoft.com/office/drawing/2014/main" id="{30FA8F9C-2F2A-440F-88A2-3575533817C0}"/>
               </a:ext>
             </a:extLst>
           </p:cNvPr>
@@ -914,7 +914,7 @@
           <p:cNvPr id="6" name="Slide Number Placeholder 5">
             <a:extLst>
               <a:ext uri="{FF2B5EF4-FFF2-40B4-BE49-F238E27FC236}">
-                <a16:creationId xmlns:a16="http://schemas.microsoft.com/office/drawing/2014/main" xmlns="" id="{A0B4216F-93E5-4681-9A2E-7AAB30CD723E}"/>
+                <a16:creationId xmlns="" xmlns:a16="http://schemas.microsoft.com/office/drawing/2014/main" id="{A0B4216F-93E5-4681-9A2E-7AAB30CD723E}"/>
               </a:ext>
             </a:extLst>
           </p:cNvPr>
@@ -973,7 +973,7 @@
           <p:cNvPr id="2" name="Title 1">
             <a:extLst>
               <a:ext uri="{FF2B5EF4-FFF2-40B4-BE49-F238E27FC236}">
-                <a16:creationId xmlns:a16="http://schemas.microsoft.com/office/drawing/2014/main" xmlns="" id="{C2B36304-E80B-4704-9227-BD4599ADE75F}"/>
+                <a16:creationId xmlns="" xmlns:a16="http://schemas.microsoft.com/office/drawing/2014/main" id="{C2B36304-E80B-4704-9227-BD4599ADE75F}"/>
               </a:ext>
             </a:extLst>
           </p:cNvPr>
@@ -1010,7 +1010,7 @@
           <p:cNvPr id="3" name="Text Placeholder 2">
             <a:extLst>
               <a:ext uri="{FF2B5EF4-FFF2-40B4-BE49-F238E27FC236}">
-                <a16:creationId xmlns:a16="http://schemas.microsoft.com/office/drawing/2014/main" xmlns="" id="{9B19717F-46B5-42C8-9AF4-8CD50FAF0FFD}"/>
+                <a16:creationId xmlns="" xmlns:a16="http://schemas.microsoft.com/office/drawing/2014/main" id="{9B19717F-46B5-42C8-9AF4-8CD50FAF0FFD}"/>
               </a:ext>
             </a:extLst>
           </p:cNvPr>
@@ -1135,7 +1135,7 @@
           <p:cNvPr id="4" name="Date Placeholder 3">
             <a:extLst>
               <a:ext uri="{FF2B5EF4-FFF2-40B4-BE49-F238E27FC236}">
-                <a16:creationId xmlns:a16="http://schemas.microsoft.com/office/drawing/2014/main" xmlns="" id="{D8C750D7-3EFB-401E-907E-37D0FE9BEFF5}"/>
+                <a16:creationId xmlns="" xmlns:a16="http://schemas.microsoft.com/office/drawing/2014/main" id="{D8C750D7-3EFB-401E-907E-37D0FE9BEFF5}"/>
               </a:ext>
             </a:extLst>
           </p:cNvPr>
@@ -1164,7 +1164,7 @@
           <p:cNvPr id="5" name="Footer Placeholder 4">
             <a:extLst>
               <a:ext uri="{FF2B5EF4-FFF2-40B4-BE49-F238E27FC236}">
-                <a16:creationId xmlns:a16="http://schemas.microsoft.com/office/drawing/2014/main" xmlns="" id="{0F880988-D94C-4A9E-A2C2-2D3BB2C809D1}"/>
+                <a16:creationId xmlns="" xmlns:a16="http://schemas.microsoft.com/office/drawing/2014/main" id="{0F880988-D94C-4A9E-A2C2-2D3BB2C809D1}"/>
               </a:ext>
             </a:extLst>
           </p:cNvPr>
@@ -1189,7 +1189,7 @@
           <p:cNvPr id="6" name="Slide Number Placeholder 5">
             <a:extLst>
               <a:ext uri="{FF2B5EF4-FFF2-40B4-BE49-F238E27FC236}">
-                <a16:creationId xmlns:a16="http://schemas.microsoft.com/office/drawing/2014/main" xmlns="" id="{E4F98BA4-4ADB-402F-B38A-711911A55244}"/>
+                <a16:creationId xmlns="" xmlns:a16="http://schemas.microsoft.com/office/drawing/2014/main" id="{E4F98BA4-4ADB-402F-B38A-711911A55244}"/>
               </a:ext>
             </a:extLst>
           </p:cNvPr>
@@ -1248,7 +1248,7 @@
           <p:cNvPr id="2" name="Title 1">
             <a:extLst>
               <a:ext uri="{FF2B5EF4-FFF2-40B4-BE49-F238E27FC236}">
-                <a16:creationId xmlns:a16="http://schemas.microsoft.com/office/drawing/2014/main" xmlns="" id="{D4FC2318-BD94-462B-A8F1-9B236BA1E906}"/>
+                <a16:creationId xmlns="" xmlns:a16="http://schemas.microsoft.com/office/drawing/2014/main" id="{D4FC2318-BD94-462B-A8F1-9B236BA1E906}"/>
               </a:ext>
             </a:extLst>
           </p:cNvPr>
@@ -1276,7 +1276,7 @@
           <p:cNvPr id="3" name="Content Placeholder 2">
             <a:extLst>
               <a:ext uri="{FF2B5EF4-FFF2-40B4-BE49-F238E27FC236}">
-                <a16:creationId xmlns:a16="http://schemas.microsoft.com/office/drawing/2014/main" xmlns="" id="{1F561BF1-D67C-4FE9-91D1-3FFBD3401FA3}"/>
+                <a16:creationId xmlns="" xmlns:a16="http://schemas.microsoft.com/office/drawing/2014/main" id="{1F561BF1-D67C-4FE9-91D1-3FFBD3401FA3}"/>
               </a:ext>
             </a:extLst>
           </p:cNvPr>
@@ -1338,7 +1338,7 @@
           <p:cNvPr id="4" name="Content Placeholder 3">
             <a:extLst>
               <a:ext uri="{FF2B5EF4-FFF2-40B4-BE49-F238E27FC236}">
-                <a16:creationId xmlns:a16="http://schemas.microsoft.com/office/drawing/2014/main" xmlns="" id="{281286E1-FCED-4B4D-8988-A532D4273001}"/>
+                <a16:creationId xmlns="" xmlns:a16="http://schemas.microsoft.com/office/drawing/2014/main" id="{281286E1-FCED-4B4D-8988-A532D4273001}"/>
               </a:ext>
             </a:extLst>
           </p:cNvPr>
@@ -1400,7 +1400,7 @@
           <p:cNvPr id="5" name="Date Placeholder 4">
             <a:extLst>
               <a:ext uri="{FF2B5EF4-FFF2-40B4-BE49-F238E27FC236}">
-                <a16:creationId xmlns:a16="http://schemas.microsoft.com/office/drawing/2014/main" xmlns="" id="{88FEED14-AED0-4C3E-BE8D-54C9B0804238}"/>
+                <a16:creationId xmlns="" xmlns:a16="http://schemas.microsoft.com/office/drawing/2014/main" id="{88FEED14-AED0-4C3E-BE8D-54C9B0804238}"/>
               </a:ext>
             </a:extLst>
           </p:cNvPr>
@@ -1429,7 +1429,7 @@
           <p:cNvPr id="6" name="Footer Placeholder 5">
             <a:extLst>
               <a:ext uri="{FF2B5EF4-FFF2-40B4-BE49-F238E27FC236}">
-                <a16:creationId xmlns:a16="http://schemas.microsoft.com/office/drawing/2014/main" xmlns="" id="{D292634D-AAE3-4EB7-8279-598A685C5CDB}"/>
+                <a16:creationId xmlns="" xmlns:a16="http://schemas.microsoft.com/office/drawing/2014/main" id="{D292634D-AAE3-4EB7-8279-598A685C5CDB}"/>
               </a:ext>
             </a:extLst>
           </p:cNvPr>
@@ -1454,7 +1454,7 @@
           <p:cNvPr id="7" name="Slide Number Placeholder 6">
             <a:extLst>
               <a:ext uri="{FF2B5EF4-FFF2-40B4-BE49-F238E27FC236}">
-                <a16:creationId xmlns:a16="http://schemas.microsoft.com/office/drawing/2014/main" xmlns="" id="{875B3F94-30E3-4BAF-969B-9E4F986B3298}"/>
+                <a16:creationId xmlns="" xmlns:a16="http://schemas.microsoft.com/office/drawing/2014/main" id="{875B3F94-30E3-4BAF-969B-9E4F986B3298}"/>
               </a:ext>
             </a:extLst>
           </p:cNvPr>
@@ -1513,7 +1513,7 @@
           <p:cNvPr id="2" name="Title 1">
             <a:extLst>
               <a:ext uri="{FF2B5EF4-FFF2-40B4-BE49-F238E27FC236}">
-                <a16:creationId xmlns:a16="http://schemas.microsoft.com/office/drawing/2014/main" xmlns="" id="{32455E56-C711-4A5F-85EF-EC6BC0DAE32D}"/>
+                <a16:creationId xmlns="" xmlns:a16="http://schemas.microsoft.com/office/drawing/2014/main" id="{32455E56-C711-4A5F-85EF-EC6BC0DAE32D}"/>
               </a:ext>
             </a:extLst>
           </p:cNvPr>
@@ -1546,7 +1546,7 @@
           <p:cNvPr id="3" name="Text Placeholder 2">
             <a:extLst>
               <a:ext uri="{FF2B5EF4-FFF2-40B4-BE49-F238E27FC236}">
-                <a16:creationId xmlns:a16="http://schemas.microsoft.com/office/drawing/2014/main" xmlns="" id="{25DF1123-BF5C-4C5B-966A-BCAA672D30D8}"/>
+                <a16:creationId xmlns="" xmlns:a16="http://schemas.microsoft.com/office/drawing/2014/main" id="{25DF1123-BF5C-4C5B-966A-BCAA672D30D8}"/>
               </a:ext>
             </a:extLst>
           </p:cNvPr>
@@ -1617,7 +1617,7 @@
           <p:cNvPr id="4" name="Content Placeholder 3">
             <a:extLst>
               <a:ext uri="{FF2B5EF4-FFF2-40B4-BE49-F238E27FC236}">
-                <a16:creationId xmlns:a16="http://schemas.microsoft.com/office/drawing/2014/main" xmlns="" id="{41915B5C-BAFB-496C-A48F-10213E28D518}"/>
+                <a16:creationId xmlns="" xmlns:a16="http://schemas.microsoft.com/office/drawing/2014/main" id="{41915B5C-BAFB-496C-A48F-10213E28D518}"/>
               </a:ext>
             </a:extLst>
           </p:cNvPr>
@@ -1679,7 +1679,7 @@
           <p:cNvPr id="5" name="Text Placeholder 4">
             <a:extLst>
               <a:ext uri="{FF2B5EF4-FFF2-40B4-BE49-F238E27FC236}">
-                <a16:creationId xmlns:a16="http://schemas.microsoft.com/office/drawing/2014/main" xmlns="" id="{DC1B892F-BCB3-4F60-A4AC-A65D21D34008}"/>
+                <a16:creationId xmlns="" xmlns:a16="http://schemas.microsoft.com/office/drawing/2014/main" id="{DC1B892F-BCB3-4F60-A4AC-A65D21D34008}"/>
               </a:ext>
             </a:extLst>
           </p:cNvPr>
@@ -1750,7 +1750,7 @@
           <p:cNvPr id="6" name="Content Placeholder 5">
             <a:extLst>
               <a:ext uri="{FF2B5EF4-FFF2-40B4-BE49-F238E27FC236}">
-                <a16:creationId xmlns:a16="http://schemas.microsoft.com/office/drawing/2014/main" xmlns="" id="{AD84EFB1-D7B2-46BB-9986-880661B09BE6}"/>
+                <a16:creationId xmlns="" xmlns:a16="http://schemas.microsoft.com/office/drawing/2014/main" id="{AD84EFB1-D7B2-46BB-9986-880661B09BE6}"/>
               </a:ext>
             </a:extLst>
           </p:cNvPr>
@@ -1812,7 +1812,7 @@
           <p:cNvPr id="7" name="Date Placeholder 6">
             <a:extLst>
               <a:ext uri="{FF2B5EF4-FFF2-40B4-BE49-F238E27FC236}">
-                <a16:creationId xmlns:a16="http://schemas.microsoft.com/office/drawing/2014/main" xmlns="" id="{1D818B26-0597-4DF5-9763-321830FE471F}"/>
+                <a16:creationId xmlns="" xmlns:a16="http://schemas.microsoft.com/office/drawing/2014/main" id="{1D818B26-0597-4DF5-9763-321830FE471F}"/>
               </a:ext>
             </a:extLst>
           </p:cNvPr>
@@ -1841,7 +1841,7 @@
           <p:cNvPr id="8" name="Footer Placeholder 7">
             <a:extLst>
               <a:ext uri="{FF2B5EF4-FFF2-40B4-BE49-F238E27FC236}">
-                <a16:creationId xmlns:a16="http://schemas.microsoft.com/office/drawing/2014/main" xmlns="" id="{D9C1177A-261A-4C2B-83C9-4D63FD97AEAC}"/>
+                <a16:creationId xmlns="" xmlns:a16="http://schemas.microsoft.com/office/drawing/2014/main" id="{D9C1177A-261A-4C2B-83C9-4D63FD97AEAC}"/>
               </a:ext>
             </a:extLst>
           </p:cNvPr>
@@ -1866,7 +1866,7 @@
           <p:cNvPr id="9" name="Slide Number Placeholder 8">
             <a:extLst>
               <a:ext uri="{FF2B5EF4-FFF2-40B4-BE49-F238E27FC236}">
-                <a16:creationId xmlns:a16="http://schemas.microsoft.com/office/drawing/2014/main" xmlns="" id="{FADD913E-0C98-4611-94C9-ED4F4D325163}"/>
+                <a16:creationId xmlns="" xmlns:a16="http://schemas.microsoft.com/office/drawing/2014/main" id="{FADD913E-0C98-4611-94C9-ED4F4D325163}"/>
               </a:ext>
             </a:extLst>
           </p:cNvPr>
@@ -1925,7 +1925,7 @@
           <p:cNvPr id="2" name="Title 1">
             <a:extLst>
               <a:ext uri="{FF2B5EF4-FFF2-40B4-BE49-F238E27FC236}">
-                <a16:creationId xmlns:a16="http://schemas.microsoft.com/office/drawing/2014/main" xmlns="" id="{BC618DB2-18FB-4DAA-8360-91C5CE97A317}"/>
+                <a16:creationId xmlns="" xmlns:a16="http://schemas.microsoft.com/office/drawing/2014/main" id="{BC618DB2-18FB-4DAA-8360-91C5CE97A317}"/>
               </a:ext>
             </a:extLst>
           </p:cNvPr>
@@ -1953,7 +1953,7 @@
           <p:cNvPr id="3" name="Date Placeholder 2">
             <a:extLst>
               <a:ext uri="{FF2B5EF4-FFF2-40B4-BE49-F238E27FC236}">
-                <a16:creationId xmlns:a16="http://schemas.microsoft.com/office/drawing/2014/main" xmlns="" id="{192A9BD7-130F-48E4-93A8-D36FCFE94593}"/>
+                <a16:creationId xmlns="" xmlns:a16="http://schemas.microsoft.com/office/drawing/2014/main" id="{192A9BD7-130F-48E4-93A8-D36FCFE94593}"/>
               </a:ext>
             </a:extLst>
           </p:cNvPr>
@@ -1982,7 +1982,7 @@
           <p:cNvPr id="4" name="Footer Placeholder 3">
             <a:extLst>
               <a:ext uri="{FF2B5EF4-FFF2-40B4-BE49-F238E27FC236}">
-                <a16:creationId xmlns:a16="http://schemas.microsoft.com/office/drawing/2014/main" xmlns="" id="{321DA2C5-31F6-4360-99A4-64DF94EE1E3E}"/>
+                <a16:creationId xmlns="" xmlns:a16="http://schemas.microsoft.com/office/drawing/2014/main" id="{321DA2C5-31F6-4360-99A4-64DF94EE1E3E}"/>
               </a:ext>
             </a:extLst>
           </p:cNvPr>
@@ -2007,7 +2007,7 @@
           <p:cNvPr id="5" name="Slide Number Placeholder 4">
             <a:extLst>
               <a:ext uri="{FF2B5EF4-FFF2-40B4-BE49-F238E27FC236}">
-                <a16:creationId xmlns:a16="http://schemas.microsoft.com/office/drawing/2014/main" xmlns="" id="{C7DED1C8-1F44-4931-95A5-4CFBF3193408}"/>
+                <a16:creationId xmlns="" xmlns:a16="http://schemas.microsoft.com/office/drawing/2014/main" id="{C7DED1C8-1F44-4931-95A5-4CFBF3193408}"/>
               </a:ext>
             </a:extLst>
           </p:cNvPr>
@@ -2066,7 +2066,7 @@
           <p:cNvPr id="2" name="Date Placeholder 1">
             <a:extLst>
               <a:ext uri="{FF2B5EF4-FFF2-40B4-BE49-F238E27FC236}">
-                <a16:creationId xmlns:a16="http://schemas.microsoft.com/office/drawing/2014/main" xmlns="" id="{B3419324-B673-4C8A-9155-119D365D7D44}"/>
+                <a16:creationId xmlns="" xmlns:a16="http://schemas.microsoft.com/office/drawing/2014/main" id="{B3419324-B673-4C8A-9155-119D365D7D44}"/>
               </a:ext>
             </a:extLst>
           </p:cNvPr>
@@ -2095,7 +2095,7 @@
           <p:cNvPr id="3" name="Footer Placeholder 2">
             <a:extLst>
               <a:ext uri="{FF2B5EF4-FFF2-40B4-BE49-F238E27FC236}">
-                <a16:creationId xmlns:a16="http://schemas.microsoft.com/office/drawing/2014/main" xmlns="" id="{4B8F4D7D-D4E6-4D06-9A03-37964F0BCB35}"/>
+                <a16:creationId xmlns="" xmlns:a16="http://schemas.microsoft.com/office/drawing/2014/main" id="{4B8F4D7D-D4E6-4D06-9A03-37964F0BCB35}"/>
               </a:ext>
             </a:extLst>
           </p:cNvPr>
@@ -2120,7 +2120,7 @@
           <p:cNvPr id="4" name="Slide Number Placeholder 3">
             <a:extLst>
               <a:ext uri="{FF2B5EF4-FFF2-40B4-BE49-F238E27FC236}">
-                <a16:creationId xmlns:a16="http://schemas.microsoft.com/office/drawing/2014/main" xmlns="" id="{F4D247D1-B810-4644-8BB6-B41C28A33DB2}"/>
+                <a16:creationId xmlns="" xmlns:a16="http://schemas.microsoft.com/office/drawing/2014/main" id="{F4D247D1-B810-4644-8BB6-B41C28A33DB2}"/>
               </a:ext>
             </a:extLst>
           </p:cNvPr>
@@ -2179,7 +2179,7 @@
           <p:cNvPr id="2" name="Title 1">
             <a:extLst>
               <a:ext uri="{FF2B5EF4-FFF2-40B4-BE49-F238E27FC236}">
-                <a16:creationId xmlns:a16="http://schemas.microsoft.com/office/drawing/2014/main" xmlns="" id="{15AE3250-45A2-44A6-9723-89CD77361683}"/>
+                <a16:creationId xmlns="" xmlns:a16="http://schemas.microsoft.com/office/drawing/2014/main" id="{15AE3250-45A2-44A6-9723-89CD77361683}"/>
               </a:ext>
             </a:extLst>
           </p:cNvPr>
@@ -2216,7 +2216,7 @@
           <p:cNvPr id="3" name="Content Placeholder 2">
             <a:extLst>
               <a:ext uri="{FF2B5EF4-FFF2-40B4-BE49-F238E27FC236}">
-                <a16:creationId xmlns:a16="http://schemas.microsoft.com/office/drawing/2014/main" xmlns="" id="{3AB327E7-2A1B-487F-AC19-6ECF253EB86F}"/>
+                <a16:creationId xmlns="" xmlns:a16="http://schemas.microsoft.com/office/drawing/2014/main" id="{3AB327E7-2A1B-487F-AC19-6ECF253EB86F}"/>
               </a:ext>
             </a:extLst>
           </p:cNvPr>
@@ -2306,7 +2306,7 @@
           <p:cNvPr id="4" name="Text Placeholder 3">
             <a:extLst>
               <a:ext uri="{FF2B5EF4-FFF2-40B4-BE49-F238E27FC236}">
-                <a16:creationId xmlns:a16="http://schemas.microsoft.com/office/drawing/2014/main" xmlns="" id="{6C03DED6-2C9D-40B2-B0A4-37C78D0DF360}"/>
+                <a16:creationId xmlns="" xmlns:a16="http://schemas.microsoft.com/office/drawing/2014/main" id="{6C03DED6-2C9D-40B2-B0A4-37C78D0DF360}"/>
               </a:ext>
             </a:extLst>
           </p:cNvPr>
@@ -2377,7 +2377,7 @@
           <p:cNvPr id="5" name="Date Placeholder 4">
             <a:extLst>
               <a:ext uri="{FF2B5EF4-FFF2-40B4-BE49-F238E27FC236}">
-                <a16:creationId xmlns:a16="http://schemas.microsoft.com/office/drawing/2014/main" xmlns="" id="{A8CEB13A-79B9-466F-A689-70BF83431C7B}"/>
+                <a16:creationId xmlns="" xmlns:a16="http://schemas.microsoft.com/office/drawing/2014/main" id="{A8CEB13A-79B9-466F-A689-70BF83431C7B}"/>
               </a:ext>
             </a:extLst>
           </p:cNvPr>
@@ -2406,7 +2406,7 @@
           <p:cNvPr id="6" name="Footer Placeholder 5">
             <a:extLst>
               <a:ext uri="{FF2B5EF4-FFF2-40B4-BE49-F238E27FC236}">
-                <a16:creationId xmlns:a16="http://schemas.microsoft.com/office/drawing/2014/main" xmlns="" id="{EA9AED05-0E1A-449F-8CC5-B658366A9833}"/>
+                <a16:creationId xmlns="" xmlns:a16="http://schemas.microsoft.com/office/drawing/2014/main" id="{EA9AED05-0E1A-449F-8CC5-B658366A9833}"/>
               </a:ext>
             </a:extLst>
           </p:cNvPr>
@@ -2431,7 +2431,7 @@
           <p:cNvPr id="7" name="Slide Number Placeholder 6">
             <a:extLst>
               <a:ext uri="{FF2B5EF4-FFF2-40B4-BE49-F238E27FC236}">
-                <a16:creationId xmlns:a16="http://schemas.microsoft.com/office/drawing/2014/main" xmlns="" id="{6E61978B-15CB-4694-9975-C943237FBD16}"/>
+                <a16:creationId xmlns="" xmlns:a16="http://schemas.microsoft.com/office/drawing/2014/main" id="{6E61978B-15CB-4694-9975-C943237FBD16}"/>
               </a:ext>
             </a:extLst>
           </p:cNvPr>
@@ -2490,7 +2490,7 @@
           <p:cNvPr id="2" name="Title 1">
             <a:extLst>
               <a:ext uri="{FF2B5EF4-FFF2-40B4-BE49-F238E27FC236}">
-                <a16:creationId xmlns:a16="http://schemas.microsoft.com/office/drawing/2014/main" xmlns="" id="{D4A3446B-AE1B-434C-A2AE-3751B885FCCF}"/>
+                <a16:creationId xmlns="" xmlns:a16="http://schemas.microsoft.com/office/drawing/2014/main" id="{D4A3446B-AE1B-434C-A2AE-3751B885FCCF}"/>
               </a:ext>
             </a:extLst>
           </p:cNvPr>
@@ -2527,7 +2527,7 @@
           <p:cNvPr id="3" name="Picture Placeholder 2">
             <a:extLst>
               <a:ext uri="{FF2B5EF4-FFF2-40B4-BE49-F238E27FC236}">
-                <a16:creationId xmlns:a16="http://schemas.microsoft.com/office/drawing/2014/main" xmlns="" id="{F9706E78-1242-4BA1-B2F8-DBEA3E2A973E}"/>
+                <a16:creationId xmlns="" xmlns:a16="http://schemas.microsoft.com/office/drawing/2014/main" id="{F9706E78-1242-4BA1-B2F8-DBEA3E2A973E}"/>
               </a:ext>
             </a:extLst>
           </p:cNvPr>
@@ -2594,7 +2594,7 @@
           <p:cNvPr id="4" name="Text Placeholder 3">
             <a:extLst>
               <a:ext uri="{FF2B5EF4-FFF2-40B4-BE49-F238E27FC236}">
-                <a16:creationId xmlns:a16="http://schemas.microsoft.com/office/drawing/2014/main" xmlns="" id="{5F65BDBE-3135-47D6-ACB1-642FB485DA30}"/>
+                <a16:creationId xmlns="" xmlns:a16="http://schemas.microsoft.com/office/drawing/2014/main" id="{5F65BDBE-3135-47D6-ACB1-642FB485DA30}"/>
               </a:ext>
             </a:extLst>
           </p:cNvPr>
@@ -2665,7 +2665,7 @@
           <p:cNvPr id="5" name="Date Placeholder 4">
             <a:extLst>
               <a:ext uri="{FF2B5EF4-FFF2-40B4-BE49-F238E27FC236}">
-                <a16:creationId xmlns:a16="http://schemas.microsoft.com/office/drawing/2014/main" xmlns="" id="{C083E1DB-374D-46B9-8FE8-6A710E0015FE}"/>
+                <a16:creationId xmlns="" xmlns:a16="http://schemas.microsoft.com/office/drawing/2014/main" id="{C083E1DB-374D-46B9-8FE8-6A710E0015FE}"/>
               </a:ext>
             </a:extLst>
           </p:cNvPr>
@@ -2694,7 +2694,7 @@
           <p:cNvPr id="6" name="Footer Placeholder 5">
             <a:extLst>
               <a:ext uri="{FF2B5EF4-FFF2-40B4-BE49-F238E27FC236}">
-                <a16:creationId xmlns:a16="http://schemas.microsoft.com/office/drawing/2014/main" xmlns="" id="{69154990-CF32-4A93-8890-8367FDFCFDB2}"/>
+                <a16:creationId xmlns="" xmlns:a16="http://schemas.microsoft.com/office/drawing/2014/main" id="{69154990-CF32-4A93-8890-8367FDFCFDB2}"/>
               </a:ext>
             </a:extLst>
           </p:cNvPr>
@@ -2719,7 +2719,7 @@
           <p:cNvPr id="7" name="Slide Number Placeholder 6">
             <a:extLst>
               <a:ext uri="{FF2B5EF4-FFF2-40B4-BE49-F238E27FC236}">
-                <a16:creationId xmlns:a16="http://schemas.microsoft.com/office/drawing/2014/main" xmlns="" id="{0ED00F40-AB49-42AB-8A12-8838BB5C9479}"/>
+                <a16:creationId xmlns="" xmlns:a16="http://schemas.microsoft.com/office/drawing/2014/main" id="{0ED00F40-AB49-42AB-8A12-8838BB5C9479}"/>
               </a:ext>
             </a:extLst>
           </p:cNvPr>
@@ -2783,7 +2783,7 @@
           <p:cNvPr id="2" name="Title Placeholder 1">
             <a:extLst>
               <a:ext uri="{FF2B5EF4-FFF2-40B4-BE49-F238E27FC236}">
-                <a16:creationId xmlns:a16="http://schemas.microsoft.com/office/drawing/2014/main" xmlns="" id="{3C293650-B304-4F54-86C2-CB9AB0E01ACE}"/>
+                <a16:creationId xmlns="" xmlns:a16="http://schemas.microsoft.com/office/drawing/2014/main" id="{3C293650-B304-4F54-86C2-CB9AB0E01ACE}"/>
               </a:ext>
             </a:extLst>
           </p:cNvPr>
@@ -2821,7 +2821,7 @@
           <p:cNvPr id="3" name="Text Placeholder 2">
             <a:extLst>
               <a:ext uri="{FF2B5EF4-FFF2-40B4-BE49-F238E27FC236}">
-                <a16:creationId xmlns:a16="http://schemas.microsoft.com/office/drawing/2014/main" xmlns="" id="{0F94AEFA-3FB4-44CB-8FC3-665909F19B1B}"/>
+                <a16:creationId xmlns="" xmlns:a16="http://schemas.microsoft.com/office/drawing/2014/main" id="{0F94AEFA-3FB4-44CB-8FC3-665909F19B1B}"/>
               </a:ext>
             </a:extLst>
           </p:cNvPr>
@@ -2888,7 +2888,7 @@
           <p:cNvPr id="4" name="Date Placeholder 3">
             <a:extLst>
               <a:ext uri="{FF2B5EF4-FFF2-40B4-BE49-F238E27FC236}">
-                <a16:creationId xmlns:a16="http://schemas.microsoft.com/office/drawing/2014/main" xmlns="" id="{E6FBBCA1-D16D-4FEF-85C4-B458EBE96722}"/>
+                <a16:creationId xmlns="" xmlns:a16="http://schemas.microsoft.com/office/drawing/2014/main" id="{E6FBBCA1-D16D-4FEF-85C4-B458EBE96722}"/>
               </a:ext>
             </a:extLst>
           </p:cNvPr>
@@ -2935,7 +2935,7 @@
           <p:cNvPr id="5" name="Footer Placeholder 4">
             <a:extLst>
               <a:ext uri="{FF2B5EF4-FFF2-40B4-BE49-F238E27FC236}">
-                <a16:creationId xmlns:a16="http://schemas.microsoft.com/office/drawing/2014/main" xmlns="" id="{EB108423-2FD6-48CF-B529-AEE16E2EAAA1}"/>
+                <a16:creationId xmlns="" xmlns:a16="http://schemas.microsoft.com/office/drawing/2014/main" id="{EB108423-2FD6-48CF-B529-AEE16E2EAAA1}"/>
               </a:ext>
             </a:extLst>
           </p:cNvPr>
@@ -2978,7 +2978,7 @@
           <p:cNvPr id="6" name="Slide Number Placeholder 5">
             <a:extLst>
               <a:ext uri="{FF2B5EF4-FFF2-40B4-BE49-F238E27FC236}">
-                <a16:creationId xmlns:a16="http://schemas.microsoft.com/office/drawing/2014/main" xmlns="" id="{89FBC860-9EB4-41CC-8FA6-BB58944089D7}"/>
+                <a16:creationId xmlns="" xmlns:a16="http://schemas.microsoft.com/office/drawing/2014/main" id="{89FBC860-9EB4-41CC-8FA6-BB58944089D7}"/>
               </a:ext>
             </a:extLst>
           </p:cNvPr>
@@ -3346,7 +3346,7 @@
           <p:cNvPr id="2" name="Title 1">
             <a:extLst>
               <a:ext uri="{FF2B5EF4-FFF2-40B4-BE49-F238E27FC236}">
-                <a16:creationId xmlns:a16="http://schemas.microsoft.com/office/drawing/2014/main" xmlns="" id="{D44CBB88-75A0-46BE-A9D5-1302138C3289}"/>
+                <a16:creationId xmlns="" xmlns:a16="http://schemas.microsoft.com/office/drawing/2014/main" id="{D44CBB88-75A0-46BE-A9D5-1302138C3289}"/>
               </a:ext>
             </a:extLst>
           </p:cNvPr>
@@ -3370,8 +3370,12 @@
           <a:lstStyle/>
           <a:p>
             <a:r>
+              <a:rPr lang="en-US" dirty="0" smtClean="0"/>
+              <a:t>Determining </a:t>
+            </a:r>
+            <a:r>
               <a:rPr lang="en-US" dirty="0"/>
-              <a:t>Determining which variables contribute to shot success rate in soccer</a:t>
+              <a:t>which variables contribute to shot success rate in soccer</a:t>
             </a:r>
           </a:p>
         </p:txBody>
@@ -3381,7 +3385,7 @@
           <p:cNvPr id="3" name="Subtitle 2">
             <a:extLst>
               <a:ext uri="{FF2B5EF4-FFF2-40B4-BE49-F238E27FC236}">
-                <a16:creationId xmlns:a16="http://schemas.microsoft.com/office/drawing/2014/main" xmlns="" id="{572D7E2B-2D66-4A45-B7BD-8A0BC144AD36}"/>
+                <a16:creationId xmlns="" xmlns:a16="http://schemas.microsoft.com/office/drawing/2014/main" id="{572D7E2B-2D66-4A45-B7BD-8A0BC144AD36}"/>
               </a:ext>
             </a:extLst>
           </p:cNvPr>
@@ -3420,8 +3424,12 @@
           </a:p>
           <a:p>
             <a:r>
+              <a:rPr lang="en-US" smtClean="0"/>
+              <a:t>March 8, </a:t>
+            </a:r>
+            <a:r>
               <a:rPr lang="en-US" dirty="0"/>
-              <a:t>February 2, 2022</a:t>
+              <a:t>2022</a:t>
             </a:r>
           </a:p>
         </p:txBody>
@@ -3461,7 +3469,7 @@
           <p:cNvPr id="2" name="TextBox 1">
             <a:extLst>
               <a:ext uri="{FF2B5EF4-FFF2-40B4-BE49-F238E27FC236}">
-                <a16:creationId xmlns:a16="http://schemas.microsoft.com/office/drawing/2014/main" xmlns="" id="{1E9E0E37-71F7-4506-A4A0-38A592F50849}"/>
+                <a16:creationId xmlns="" xmlns:a16="http://schemas.microsoft.com/office/drawing/2014/main" id="{1E9E0E37-71F7-4506-A4A0-38A592F50849}"/>
               </a:ext>
             </a:extLst>
           </p:cNvPr>
@@ -3471,7 +3479,7 @@
         <p:spPr>
           <a:xfrm>
             <a:off x="622571" y="291830"/>
-            <a:ext cx="3150799" cy="584775"/>
+            <a:ext cx="6533135" cy="584775"/>
           </a:xfrm>
           <a:prstGeom prst="rect">
             <a:avLst/>
@@ -3486,7 +3494,7 @@
           <a:p>
             <a:r>
               <a:rPr lang="en-US" sz="3200" b="1" dirty="0" smtClean="0"/>
-              <a:t>Assist </a:t>
+              <a:t>Hypothesis Testing: Assist </a:t>
             </a:r>
             <a:r>
               <a:rPr lang="en-US" sz="3200" b="1" dirty="0" err="1" smtClean="0"/>
@@ -3590,10 +3598,252 @@
           </a:prstGeom>
         </p:spPr>
       </p:pic>
+      <p:sp>
+        <p:nvSpPr>
+          <p:cNvPr id="7" name="TextBox 6"/>
+          <p:cNvSpPr txBox="1"/>
+          <p:nvPr/>
+        </p:nvSpPr>
+        <p:spPr>
+          <a:xfrm>
+            <a:off x="8537443" y="876605"/>
+            <a:ext cx="2727434" cy="1200329"/>
+          </a:xfrm>
+          <a:prstGeom prst="rect">
+            <a:avLst/>
+          </a:prstGeom>
+        </p:spPr>
+        <p:style>
+          <a:lnRef idx="2">
+            <a:schemeClr val="accent3"/>
+          </a:lnRef>
+          <a:fillRef idx="1">
+            <a:schemeClr val="lt1"/>
+          </a:fillRef>
+          <a:effectRef idx="0">
+            <a:schemeClr val="accent3"/>
+          </a:effectRef>
+          <a:fontRef idx="minor">
+            <a:schemeClr val="dk1"/>
+          </a:fontRef>
+        </p:style>
+        <p:txBody>
+          <a:bodyPr wrap="square" rtlCol="0">
+            <a:spAutoFit/>
+          </a:bodyPr>
+          <a:lstStyle/>
+          <a:p>
+            <a:r>
+              <a:rPr lang="en-US" u="sng" dirty="0" smtClean="0"/>
+              <a:t>Welch Two Sample t-test</a:t>
+            </a:r>
+          </a:p>
+          <a:p>
+            <a:pPr marL="285750" indent="-285750">
+              <a:buFont typeface="Arial" panose="020B0604020202020204" pitchFamily="34" charset="0"/>
+              <a:buChar char="•"/>
+            </a:pPr>
+            <a:r>
+              <a:rPr lang="en-US" dirty="0">
+                <a:solidFill>
+                  <a:srgbClr val="FF0000"/>
+                </a:solidFill>
+              </a:rPr>
+              <a:t>p-value: &lt;</a:t>
+            </a:r>
+            <a:r>
+              <a:rPr lang="en-US" dirty="0" smtClean="0">
+                <a:solidFill>
+                  <a:srgbClr val="FF0000"/>
+                </a:solidFill>
+              </a:rPr>
+              <a:t>2e-16</a:t>
+            </a:r>
+          </a:p>
+          <a:p>
+            <a:pPr marL="285750" indent="-285750">
+              <a:buFont typeface="Arial" panose="020B0604020202020204" pitchFamily="34" charset="0"/>
+              <a:buChar char="•"/>
+            </a:pPr>
+            <a:r>
+              <a:rPr lang="en-US" dirty="0" smtClean="0"/>
+              <a:t>Assist Mean: 29.2</a:t>
+            </a:r>
+          </a:p>
+          <a:p>
+            <a:pPr marL="285750" indent="-285750">
+              <a:buFont typeface="Arial" panose="020B0604020202020204" pitchFamily="34" charset="0"/>
+              <a:buChar char="•"/>
+            </a:pPr>
+            <a:r>
+              <a:rPr lang="en-US" dirty="0" smtClean="0"/>
+              <a:t>Key Pass Mean: 33.2</a:t>
+            </a:r>
+            <a:endParaRPr lang="en-US" dirty="0"/>
+          </a:p>
+        </p:txBody>
+      </p:sp>
+      <p:sp>
+        <p:nvSpPr>
+          <p:cNvPr id="8" name="TextBox 7"/>
+          <p:cNvSpPr txBox="1"/>
+          <p:nvPr/>
+        </p:nvSpPr>
+        <p:spPr>
+          <a:xfrm>
+            <a:off x="983815" y="2656941"/>
+            <a:ext cx="2727434" cy="1200329"/>
+          </a:xfrm>
+          <a:prstGeom prst="rect">
+            <a:avLst/>
+          </a:prstGeom>
+        </p:spPr>
+        <p:style>
+          <a:lnRef idx="2">
+            <a:schemeClr val="accent3"/>
+          </a:lnRef>
+          <a:fillRef idx="1">
+            <a:schemeClr val="lt1"/>
+          </a:fillRef>
+          <a:effectRef idx="0">
+            <a:schemeClr val="accent3"/>
+          </a:effectRef>
+          <a:fontRef idx="minor">
+            <a:schemeClr val="dk1"/>
+          </a:fontRef>
+        </p:style>
+        <p:txBody>
+          <a:bodyPr wrap="square" rtlCol="0">
+            <a:spAutoFit/>
+          </a:bodyPr>
+          <a:lstStyle/>
+          <a:p>
+            <a:r>
+              <a:rPr lang="en-US" u="sng" dirty="0" smtClean="0"/>
+              <a:t>Welch Two Sample t-test</a:t>
+            </a:r>
+          </a:p>
+          <a:p>
+            <a:pPr marL="285750" indent="-285750">
+              <a:buFont typeface="Arial" panose="020B0604020202020204" pitchFamily="34" charset="0"/>
+              <a:buChar char="•"/>
+            </a:pPr>
+            <a:r>
+              <a:rPr lang="en-US" dirty="0" smtClean="0"/>
+              <a:t>p-value: 0.9</a:t>
+            </a:r>
+          </a:p>
+          <a:p>
+            <a:pPr marL="285750" indent="-285750">
+              <a:buFont typeface="Arial" panose="020B0604020202020204" pitchFamily="34" charset="0"/>
+              <a:buChar char="•"/>
+            </a:pPr>
+            <a:r>
+              <a:rPr lang="en-US" dirty="0" smtClean="0"/>
+              <a:t>Assist Mean: 84.7</a:t>
+            </a:r>
+          </a:p>
+          <a:p>
+            <a:pPr marL="285750" indent="-285750">
+              <a:buFont typeface="Arial" panose="020B0604020202020204" pitchFamily="34" charset="0"/>
+              <a:buChar char="•"/>
+            </a:pPr>
+            <a:r>
+              <a:rPr lang="en-US" dirty="0" smtClean="0"/>
+              <a:t>Key Pass Mean: </a:t>
+            </a:r>
+            <a:r>
+              <a:rPr lang="en-US" dirty="0"/>
+              <a:t>84.7</a:t>
+            </a:r>
+          </a:p>
+        </p:txBody>
+      </p:sp>
+      <p:sp>
+        <p:nvSpPr>
+          <p:cNvPr id="9" name="TextBox 8"/>
+          <p:cNvSpPr txBox="1"/>
+          <p:nvPr/>
+        </p:nvSpPr>
+        <p:spPr>
+          <a:xfrm>
+            <a:off x="8537443" y="2656940"/>
+            <a:ext cx="2727434" cy="1200329"/>
+          </a:xfrm>
+          <a:prstGeom prst="rect">
+            <a:avLst/>
+          </a:prstGeom>
+        </p:spPr>
+        <p:style>
+          <a:lnRef idx="2">
+            <a:schemeClr val="accent3"/>
+          </a:lnRef>
+          <a:fillRef idx="1">
+            <a:schemeClr val="lt1"/>
+          </a:fillRef>
+          <a:effectRef idx="0">
+            <a:schemeClr val="accent3"/>
+          </a:effectRef>
+          <a:fontRef idx="minor">
+            <a:schemeClr val="dk1"/>
+          </a:fontRef>
+        </p:style>
+        <p:txBody>
+          <a:bodyPr wrap="square" rtlCol="0">
+            <a:spAutoFit/>
+          </a:bodyPr>
+          <a:lstStyle/>
+          <a:p>
+            <a:r>
+              <a:rPr lang="en-US" u="sng" dirty="0" smtClean="0"/>
+              <a:t>Welch Two Sample t-test</a:t>
+            </a:r>
+          </a:p>
+          <a:p>
+            <a:pPr marL="285750" indent="-285750">
+              <a:buFont typeface="Arial" panose="020B0604020202020204" pitchFamily="34" charset="0"/>
+              <a:buChar char="•"/>
+            </a:pPr>
+            <a:r>
+              <a:rPr lang="en-US" dirty="0" smtClean="0"/>
+              <a:t>p-value: 0.6</a:t>
+            </a:r>
+          </a:p>
+          <a:p>
+            <a:pPr marL="285750" indent="-285750">
+              <a:buFont typeface="Arial" panose="020B0604020202020204" pitchFamily="34" charset="0"/>
+              <a:buChar char="•"/>
+            </a:pPr>
+            <a:r>
+              <a:rPr lang="en-US" dirty="0" smtClean="0"/>
+              <a:t>Assist Mean</a:t>
+            </a:r>
+            <a:r>
+              <a:rPr lang="en-US" dirty="0"/>
+              <a:t>: 51.7</a:t>
+            </a:r>
+            <a:endParaRPr lang="en-US" dirty="0" smtClean="0"/>
+          </a:p>
+          <a:p>
+            <a:pPr marL="285750" indent="-285750">
+              <a:buFont typeface="Arial" panose="020B0604020202020204" pitchFamily="34" charset="0"/>
+              <a:buChar char="•"/>
+            </a:pPr>
+            <a:r>
+              <a:rPr lang="en-US" dirty="0" smtClean="0"/>
+              <a:t>Key Pass Mean</a:t>
+            </a:r>
+            <a:r>
+              <a:rPr lang="en-US" dirty="0"/>
+              <a:t>: 52.1</a:t>
+            </a:r>
+          </a:p>
+        </p:txBody>
+      </p:sp>
     </p:spTree>
     <p:extLst>
       <p:ext uri="{BB962C8B-B14F-4D97-AF65-F5344CB8AC3E}">
-        <p14:creationId xmlns:p14="http://schemas.microsoft.com/office/powerpoint/2010/main" val="2741190650"/>
+        <p14:creationId xmlns:p14="http://schemas.microsoft.com/office/powerpoint/2010/main" val="2229208503"/>
       </p:ext>
     </p:extLst>
   </p:cSld>
@@ -3625,7 +3875,7 @@
           <p:cNvPr id="2" name="TextBox 1">
             <a:extLst>
               <a:ext uri="{FF2B5EF4-FFF2-40B4-BE49-F238E27FC236}">
-                <a16:creationId xmlns:a16="http://schemas.microsoft.com/office/drawing/2014/main" xmlns="" id="{1E9E0E37-71F7-4506-A4A0-38A592F50849}"/>
+                <a16:creationId xmlns="" xmlns:a16="http://schemas.microsoft.com/office/drawing/2014/main" id="{1E9E0E37-71F7-4506-A4A0-38A592F50849}"/>
               </a:ext>
             </a:extLst>
           </p:cNvPr>
@@ -3635,7 +3885,7 @@
         <p:spPr>
           <a:xfrm>
             <a:off x="622571" y="291830"/>
-            <a:ext cx="2289794" cy="584775"/>
+            <a:ext cx="5672130" cy="584775"/>
           </a:xfrm>
           <a:prstGeom prst="rect">
             <a:avLst/>
@@ -3650,7 +3900,7 @@
           <a:p>
             <a:r>
               <a:rPr lang="en-US" sz="3200" b="1" dirty="0" smtClean="0"/>
-              <a:t>Shot </a:t>
+              <a:t>Hypothesis Testing: Shot </a:t>
             </a:r>
             <a:r>
               <a:rPr lang="en-US" sz="3200" b="1" dirty="0" err="1" smtClean="0"/>
@@ -3754,10 +4004,278 @@
           </a:prstGeom>
         </p:spPr>
       </p:pic>
+      <p:sp>
+        <p:nvSpPr>
+          <p:cNvPr id="6" name="TextBox 5"/>
+          <p:cNvSpPr txBox="1"/>
+          <p:nvPr/>
+        </p:nvSpPr>
+        <p:spPr>
+          <a:xfrm>
+            <a:off x="8537443" y="876605"/>
+            <a:ext cx="2727434" cy="1200329"/>
+          </a:xfrm>
+          <a:prstGeom prst="rect">
+            <a:avLst/>
+          </a:prstGeom>
+        </p:spPr>
+        <p:style>
+          <a:lnRef idx="2">
+            <a:schemeClr val="accent3"/>
+          </a:lnRef>
+          <a:fillRef idx="1">
+            <a:schemeClr val="lt1"/>
+          </a:fillRef>
+          <a:effectRef idx="0">
+            <a:schemeClr val="accent3"/>
+          </a:effectRef>
+          <a:fontRef idx="minor">
+            <a:schemeClr val="dk1"/>
+          </a:fontRef>
+        </p:style>
+        <p:txBody>
+          <a:bodyPr wrap="square" rtlCol="0">
+            <a:spAutoFit/>
+          </a:bodyPr>
+          <a:lstStyle/>
+          <a:p>
+            <a:r>
+              <a:rPr lang="en-US" u="sng" dirty="0" smtClean="0"/>
+              <a:t>Welch Two Sample t-test</a:t>
+            </a:r>
+          </a:p>
+          <a:p>
+            <a:pPr marL="285750" indent="-285750">
+              <a:buFont typeface="Arial" panose="020B0604020202020204" pitchFamily="34" charset="0"/>
+              <a:buChar char="•"/>
+            </a:pPr>
+            <a:r>
+              <a:rPr lang="en-US" dirty="0">
+                <a:solidFill>
+                  <a:srgbClr val="FF0000"/>
+                </a:solidFill>
+              </a:rPr>
+              <a:t>p-value: &lt;</a:t>
+            </a:r>
+            <a:r>
+              <a:rPr lang="en-US" dirty="0" smtClean="0">
+                <a:solidFill>
+                  <a:srgbClr val="FF0000"/>
+                </a:solidFill>
+              </a:rPr>
+              <a:t>2e-16</a:t>
+            </a:r>
+          </a:p>
+          <a:p>
+            <a:pPr marL="285750" indent="-285750">
+              <a:buFont typeface="Arial" panose="020B0604020202020204" pitchFamily="34" charset="0"/>
+              <a:buChar char="•"/>
+            </a:pPr>
+            <a:r>
+              <a:rPr lang="en-US" dirty="0" smtClean="0"/>
+              <a:t>Goal Mean: 83.4</a:t>
+            </a:r>
+          </a:p>
+          <a:p>
+            <a:pPr marL="285750" indent="-285750">
+              <a:buFont typeface="Arial" panose="020B0604020202020204" pitchFamily="34" charset="0"/>
+              <a:buChar char="•"/>
+            </a:pPr>
+            <a:r>
+              <a:rPr lang="en-US" dirty="0" smtClean="0"/>
+              <a:t>Shot Mean: 78.6</a:t>
+            </a:r>
+            <a:endParaRPr lang="en-US" dirty="0"/>
+          </a:p>
+        </p:txBody>
+      </p:sp>
+      <p:sp>
+        <p:nvSpPr>
+          <p:cNvPr id="8" name="TextBox 7"/>
+          <p:cNvSpPr txBox="1"/>
+          <p:nvPr/>
+        </p:nvSpPr>
+        <p:spPr>
+          <a:xfrm>
+            <a:off x="983815" y="2656941"/>
+            <a:ext cx="2727434" cy="1200329"/>
+          </a:xfrm>
+          <a:prstGeom prst="rect">
+            <a:avLst/>
+          </a:prstGeom>
+        </p:spPr>
+        <p:style>
+          <a:lnRef idx="2">
+            <a:schemeClr val="accent3"/>
+          </a:lnRef>
+          <a:fillRef idx="1">
+            <a:schemeClr val="lt1"/>
+          </a:fillRef>
+          <a:effectRef idx="0">
+            <a:schemeClr val="accent3"/>
+          </a:effectRef>
+          <a:fontRef idx="minor">
+            <a:schemeClr val="dk1"/>
+          </a:fontRef>
+        </p:style>
+        <p:txBody>
+          <a:bodyPr wrap="square" rtlCol="0">
+            <a:spAutoFit/>
+          </a:bodyPr>
+          <a:lstStyle/>
+          <a:p>
+            <a:r>
+              <a:rPr lang="en-US" u="sng" dirty="0" smtClean="0"/>
+              <a:t>Welch Two Sample t-test</a:t>
+            </a:r>
+          </a:p>
+          <a:p>
+            <a:pPr marL="285750" indent="-285750">
+              <a:buFont typeface="Arial" panose="020B0604020202020204" pitchFamily="34" charset="0"/>
+              <a:buChar char="•"/>
+            </a:pPr>
+            <a:r>
+              <a:rPr lang="en-US" dirty="0" smtClean="0">
+                <a:solidFill>
+                  <a:srgbClr val="FF0000"/>
+                </a:solidFill>
+              </a:rPr>
+              <a:t>p-value</a:t>
+            </a:r>
+            <a:r>
+              <a:rPr lang="en-US" dirty="0">
+                <a:solidFill>
+                  <a:srgbClr val="FF0000"/>
+                </a:solidFill>
+              </a:rPr>
+              <a:t>: &lt;2e-16</a:t>
+            </a:r>
+            <a:endParaRPr lang="en-US" dirty="0" smtClean="0">
+              <a:solidFill>
+                <a:srgbClr val="FF0000"/>
+              </a:solidFill>
+            </a:endParaRPr>
+          </a:p>
+          <a:p>
+            <a:pPr marL="285750" indent="-285750">
+              <a:buFont typeface="Arial" panose="020B0604020202020204" pitchFamily="34" charset="0"/>
+              <a:buChar char="•"/>
+            </a:pPr>
+            <a:r>
+              <a:rPr lang="en-US" dirty="0" smtClean="0"/>
+              <a:t>Goal Mean</a:t>
+            </a:r>
+            <a:r>
+              <a:rPr lang="en-US" dirty="0"/>
+              <a:t>: 93.5</a:t>
+            </a:r>
+            <a:endParaRPr lang="en-US" dirty="0" smtClean="0"/>
+          </a:p>
+          <a:p>
+            <a:pPr marL="285750" indent="-285750">
+              <a:buFont typeface="Arial" panose="020B0604020202020204" pitchFamily="34" charset="0"/>
+              <a:buChar char="•"/>
+            </a:pPr>
+            <a:r>
+              <a:rPr lang="en-US" dirty="0" smtClean="0"/>
+              <a:t>Shot Mean</a:t>
+            </a:r>
+            <a:r>
+              <a:rPr lang="en-US" dirty="0"/>
+              <a:t>: 84.3</a:t>
+            </a:r>
+          </a:p>
+        </p:txBody>
+      </p:sp>
+      <p:sp>
+        <p:nvSpPr>
+          <p:cNvPr id="9" name="TextBox 8"/>
+          <p:cNvSpPr txBox="1"/>
+          <p:nvPr/>
+        </p:nvSpPr>
+        <p:spPr>
+          <a:xfrm>
+            <a:off x="8537443" y="2656940"/>
+            <a:ext cx="2727434" cy="1200329"/>
+          </a:xfrm>
+          <a:prstGeom prst="rect">
+            <a:avLst/>
+          </a:prstGeom>
+        </p:spPr>
+        <p:style>
+          <a:lnRef idx="2">
+            <a:schemeClr val="accent3"/>
+          </a:lnRef>
+          <a:fillRef idx="1">
+            <a:schemeClr val="lt1"/>
+          </a:fillRef>
+          <a:effectRef idx="0">
+            <a:schemeClr val="accent3"/>
+          </a:effectRef>
+          <a:fontRef idx="minor">
+            <a:schemeClr val="dk1"/>
+          </a:fontRef>
+        </p:style>
+        <p:txBody>
+          <a:bodyPr wrap="square" rtlCol="0">
+            <a:spAutoFit/>
+          </a:bodyPr>
+          <a:lstStyle/>
+          <a:p>
+            <a:r>
+              <a:rPr lang="en-US" u="sng" dirty="0" smtClean="0"/>
+              <a:t>Welch Two Sample t-test</a:t>
+            </a:r>
+          </a:p>
+          <a:p>
+            <a:pPr marL="285750" indent="-285750">
+              <a:buFont typeface="Arial" panose="020B0604020202020204" pitchFamily="34" charset="0"/>
+              <a:buChar char="•"/>
+            </a:pPr>
+            <a:r>
+              <a:rPr lang="en-US" dirty="0" smtClean="0">
+                <a:solidFill>
+                  <a:srgbClr val="FF0000"/>
+                </a:solidFill>
+              </a:rPr>
+              <a:t>p-value: &lt;2e-16</a:t>
+            </a:r>
+          </a:p>
+          <a:p>
+            <a:pPr marL="285750" indent="-285750">
+              <a:buFont typeface="Arial" panose="020B0604020202020204" pitchFamily="34" charset="0"/>
+              <a:buChar char="•"/>
+            </a:pPr>
+            <a:r>
+              <a:rPr lang="en-US" dirty="0" smtClean="0"/>
+              <a:t>Goal Mean</a:t>
+            </a:r>
+            <a:r>
+              <a:rPr lang="en-US" dirty="0"/>
+              <a:t>: 68.1</a:t>
+            </a:r>
+            <a:endParaRPr lang="en-US" dirty="0" smtClean="0"/>
+          </a:p>
+          <a:p>
+            <a:pPr marL="285750" indent="-285750">
+              <a:buFont typeface="Arial" panose="020B0604020202020204" pitchFamily="34" charset="0"/>
+              <a:buChar char="•"/>
+            </a:pPr>
+            <a:r>
+              <a:rPr lang="en-US" dirty="0" smtClean="0"/>
+              <a:t>Shot Mean</a:t>
+            </a:r>
+            <a:r>
+              <a:rPr lang="en-US" dirty="0"/>
+              <a:t>: 49.2</a:t>
+            </a:r>
+          </a:p>
+        </p:txBody>
+      </p:sp>
     </p:spTree>
     <p:extLst>
       <p:ext uri="{BB962C8B-B14F-4D97-AF65-F5344CB8AC3E}">
-        <p14:creationId xmlns:p14="http://schemas.microsoft.com/office/powerpoint/2010/main" val="3327911083"/>
+        <p14:creationId xmlns:p14="http://schemas.microsoft.com/office/powerpoint/2010/main" val="2546947495"/>
       </p:ext>
     </p:extLst>
   </p:cSld>
@@ -3786,218 +4304,34 @@
       </p:grpSpPr>
       <p:sp>
         <p:nvSpPr>
-          <p:cNvPr id="2" name="TextBox 1">
-            <a:extLst>
-              <a:ext uri="{FF2B5EF4-FFF2-40B4-BE49-F238E27FC236}">
-                <a16:creationId xmlns:a16="http://schemas.microsoft.com/office/drawing/2014/main" xmlns="" id="{1E9E0E37-71F7-4506-A4A0-38A592F50849}"/>
-              </a:ext>
-            </a:extLst>
-          </p:cNvPr>
-          <p:cNvSpPr txBox="1"/>
-          <p:nvPr/>
-        </p:nvSpPr>
-        <p:spPr>
-          <a:xfrm>
-            <a:off x="622571" y="291830"/>
-            <a:ext cx="6533135" cy="584775"/>
-          </a:xfrm>
-          <a:prstGeom prst="rect">
-            <a:avLst/>
-          </a:prstGeom>
-          <a:noFill/>
-        </p:spPr>
-        <p:txBody>
-          <a:bodyPr wrap="none" rtlCol="0">
-            <a:spAutoFit/>
-          </a:bodyPr>
+          <p:cNvPr id="2" name="Title 1"/>
+          <p:cNvSpPr>
+            <a:spLocks noGrp="1"/>
+          </p:cNvSpPr>
+          <p:nvPr>
+            <p:ph type="ctrTitle"/>
+          </p:nvPr>
+        </p:nvSpPr>
+        <p:spPr/>
+        <p:txBody>
+          <a:bodyPr/>
           <a:lstStyle/>
           <a:p>
             <a:r>
-              <a:rPr lang="en-US" sz="3200" b="1" dirty="0" smtClean="0"/>
-              <a:t>Hypothesis Testing: Assist </a:t>
-            </a:r>
-            <a:r>
-              <a:rPr lang="en-US" sz="3200" b="1" dirty="0" err="1" smtClean="0"/>
-              <a:t>vs</a:t>
-            </a:r>
-            <a:r>
-              <a:rPr lang="en-US" sz="3200" b="1" dirty="0" smtClean="0"/>
-              <a:t> Key Pass</a:t>
-            </a:r>
-            <a:endParaRPr lang="en-US" sz="3200" b="1" dirty="0"/>
-          </a:p>
-        </p:txBody>
-      </p:sp>
-      <p:pic>
-        <p:nvPicPr>
-          <p:cNvPr id="6" name="Picture 5"/>
-          <p:cNvPicPr>
-            <a:picLocks noChangeAspect="1"/>
-          </p:cNvPicPr>
-          <p:nvPr/>
-        </p:nvPicPr>
-        <p:blipFill>
-          <a:blip r:embed="rId2" cstate="print">
-            <a:extLst>
-              <a:ext uri="{28A0092B-C50C-407E-A947-70E740481C1C}">
-                <a14:useLocalDpi xmlns:a14="http://schemas.microsoft.com/office/drawing/2010/main" val="0"/>
-              </a:ext>
-            </a:extLst>
-          </a:blip>
-          <a:stretch>
-            <a:fillRect/>
-          </a:stretch>
-        </p:blipFill>
-        <p:spPr>
-          <a:xfrm>
-            <a:off x="3711249" y="876605"/>
-            <a:ext cx="4826194" cy="2980665"/>
-          </a:xfrm>
-          <a:prstGeom prst="rect">
-            <a:avLst/>
-          </a:prstGeom>
-        </p:spPr>
-      </p:pic>
-      <p:pic>
-        <p:nvPicPr>
-          <p:cNvPr id="10" name="Picture 9"/>
-          <p:cNvPicPr>
-            <a:picLocks noChangeAspect="1"/>
-          </p:cNvPicPr>
-          <p:nvPr/>
-        </p:nvPicPr>
-        <p:blipFill>
-          <a:blip r:embed="rId3" cstate="print">
-            <a:extLst>
-              <a:ext uri="{28A0092B-C50C-407E-A947-70E740481C1C}">
-                <a14:useLocalDpi xmlns:a14="http://schemas.microsoft.com/office/drawing/2010/main" val="0"/>
-              </a:ext>
-            </a:extLst>
-          </a:blip>
-          <a:stretch>
-            <a:fillRect/>
-          </a:stretch>
-        </p:blipFill>
-        <p:spPr>
-          <a:xfrm>
-            <a:off x="622571" y="3857270"/>
-            <a:ext cx="4528852" cy="2797027"/>
-          </a:xfrm>
-          <a:prstGeom prst="rect">
-            <a:avLst/>
-          </a:prstGeom>
-        </p:spPr>
-      </p:pic>
-      <p:pic>
-        <p:nvPicPr>
-          <p:cNvPr id="11" name="Picture 10"/>
-          <p:cNvPicPr>
-            <a:picLocks noChangeAspect="1"/>
-          </p:cNvPicPr>
-          <p:nvPr/>
-        </p:nvPicPr>
-        <p:blipFill>
-          <a:blip r:embed="rId4" cstate="print">
-            <a:extLst>
-              <a:ext uri="{28A0092B-C50C-407E-A947-70E740481C1C}">
-                <a14:useLocalDpi xmlns:a14="http://schemas.microsoft.com/office/drawing/2010/main" val="0"/>
-              </a:ext>
-            </a:extLst>
-          </a:blip>
-          <a:stretch>
-            <a:fillRect/>
-          </a:stretch>
-        </p:blipFill>
-        <p:spPr>
-          <a:xfrm>
-            <a:off x="7097269" y="3857270"/>
-            <a:ext cx="4528853" cy="2797027"/>
-          </a:xfrm>
-          <a:prstGeom prst="rect">
-            <a:avLst/>
-          </a:prstGeom>
-        </p:spPr>
-      </p:pic>
-      <p:sp>
-        <p:nvSpPr>
-          <p:cNvPr id="7" name="TextBox 6"/>
-          <p:cNvSpPr txBox="1"/>
-          <p:nvPr/>
-        </p:nvSpPr>
-        <p:spPr>
-          <a:xfrm>
-            <a:off x="8537443" y="876605"/>
-            <a:ext cx="2727434" cy="1200329"/>
-          </a:xfrm>
-          <a:prstGeom prst="rect">
-            <a:avLst/>
-          </a:prstGeom>
-        </p:spPr>
-        <p:style>
-          <a:lnRef idx="2">
-            <a:schemeClr val="accent3"/>
-          </a:lnRef>
-          <a:fillRef idx="1">
-            <a:schemeClr val="lt1"/>
-          </a:fillRef>
-          <a:effectRef idx="0">
-            <a:schemeClr val="accent3"/>
-          </a:effectRef>
-          <a:fontRef idx="minor">
-            <a:schemeClr val="dk1"/>
-          </a:fontRef>
-        </p:style>
-        <p:txBody>
-          <a:bodyPr wrap="square" rtlCol="0">
-            <a:spAutoFit/>
-          </a:bodyPr>
-          <a:lstStyle/>
-          <a:p>
-            <a:r>
-              <a:rPr lang="en-US" u="sng" dirty="0" smtClean="0"/>
-              <a:t>Welch Two Sample t-test</a:t>
-            </a:r>
-          </a:p>
-          <a:p>
-            <a:pPr marL="285750" indent="-285750">
-              <a:buFont typeface="Arial" panose="020B0604020202020204" pitchFamily="34" charset="0"/>
-              <a:buChar char="•"/>
-            </a:pPr>
-            <a:r>
-              <a:rPr lang="en-US" dirty="0">
+              <a:rPr lang="en-US" dirty="0" smtClean="0"/>
+              <a:t>Success probability (</a:t>
+            </a:r>
+            <a:r>
+              <a:rPr lang="en-US" b="1" dirty="0" smtClean="0">
                 <a:solidFill>
                   <a:srgbClr val="FF0000"/>
                 </a:solidFill>
               </a:rPr>
-              <a:t>p-value: &lt;</a:t>
-            </a:r>
-            <a:r>
-              <a:rPr lang="en-US" dirty="0" smtClean="0">
-                <a:solidFill>
-                  <a:srgbClr val="FF0000"/>
-                </a:solidFill>
-              </a:rPr>
-              <a:t>2e-16</a:t>
-            </a:r>
-          </a:p>
-          <a:p>
-            <a:pPr marL="285750" indent="-285750">
-              <a:buFont typeface="Arial" panose="020B0604020202020204" pitchFamily="34" charset="0"/>
-              <a:buChar char="•"/>
-            </a:pPr>
+              <a:t>M</a:t>
+            </a:r>
             <a:r>
               <a:rPr lang="en-US" dirty="0" smtClean="0"/>
-              <a:t>Assist Mean: 29.2</a:t>
-            </a:r>
-          </a:p>
-          <a:p>
-            <a:pPr marL="285750" indent="-285750">
-              <a:buFont typeface="Arial" panose="020B0604020202020204" pitchFamily="34" charset="0"/>
-              <a:buChar char="•"/>
-            </a:pPr>
-            <a:r>
-              <a:rPr lang="en-US" dirty="0" smtClean="0"/>
-              <a:t>Key Pass Mean: 33.2</a:t>
+              <a:t>ichael)</a:t>
             </a:r>
             <a:endParaRPr lang="en-US" dirty="0"/>
           </a:p>
@@ -4005,165 +4339,27 @@
       </p:sp>
       <p:sp>
         <p:nvSpPr>
-          <p:cNvPr id="8" name="TextBox 7"/>
-          <p:cNvSpPr txBox="1"/>
-          <p:nvPr/>
-        </p:nvSpPr>
-        <p:spPr>
-          <a:xfrm>
-            <a:off x="983815" y="2656941"/>
-            <a:ext cx="2727434" cy="1200329"/>
-          </a:xfrm>
-          <a:prstGeom prst="rect">
-            <a:avLst/>
-          </a:prstGeom>
-        </p:spPr>
-        <p:style>
-          <a:lnRef idx="2">
-            <a:schemeClr val="accent3"/>
-          </a:lnRef>
-          <a:fillRef idx="1">
-            <a:schemeClr val="lt1"/>
-          </a:fillRef>
-          <a:effectRef idx="0">
-            <a:schemeClr val="accent3"/>
-          </a:effectRef>
-          <a:fontRef idx="minor">
-            <a:schemeClr val="dk1"/>
-          </a:fontRef>
-        </p:style>
-        <p:txBody>
-          <a:bodyPr wrap="square" rtlCol="0">
-            <a:spAutoFit/>
-          </a:bodyPr>
+          <p:cNvPr id="3" name="Subtitle 2"/>
+          <p:cNvSpPr>
+            <a:spLocks noGrp="1"/>
+          </p:cNvSpPr>
+          <p:nvPr>
+            <p:ph type="subTitle" idx="1"/>
+          </p:nvPr>
+        </p:nvSpPr>
+        <p:spPr/>
+        <p:txBody>
+          <a:bodyPr/>
           <a:lstStyle/>
           <a:p>
-            <a:r>
-              <a:rPr lang="en-US" u="sng" dirty="0" smtClean="0"/>
-              <a:t>Welch Two Sample t-test</a:t>
-            </a:r>
-          </a:p>
-          <a:p>
-            <a:pPr marL="285750" indent="-285750">
-              <a:buFont typeface="Arial" panose="020B0604020202020204" pitchFamily="34" charset="0"/>
-              <a:buChar char="•"/>
-            </a:pPr>
-            <a:r>
-              <a:rPr lang="en-US" dirty="0" smtClean="0"/>
-              <a:t>p-value: 0.9</a:t>
-            </a:r>
-          </a:p>
-          <a:p>
-            <a:pPr marL="285750" indent="-285750">
-              <a:buFont typeface="Arial" panose="020B0604020202020204" pitchFamily="34" charset="0"/>
-              <a:buChar char="•"/>
-            </a:pPr>
-            <a:r>
-              <a:rPr lang="en-US" dirty="0" smtClean="0"/>
-              <a:t>Assist Mean: 84.7</a:t>
-            </a:r>
-          </a:p>
-          <a:p>
-            <a:pPr marL="285750" indent="-285750">
-              <a:buFont typeface="Arial" panose="020B0604020202020204" pitchFamily="34" charset="0"/>
-              <a:buChar char="•"/>
-            </a:pPr>
-            <a:r>
-              <a:rPr lang="en-US" dirty="0" smtClean="0"/>
-              <a:t>Key Pass Mean: </a:t>
-            </a:r>
-            <a:r>
-              <a:rPr lang="en-US" dirty="0"/>
-              <a:t>84.7</a:t>
-            </a:r>
-          </a:p>
-        </p:txBody>
-      </p:sp>
-      <p:sp>
-        <p:nvSpPr>
-          <p:cNvPr id="9" name="TextBox 8"/>
-          <p:cNvSpPr txBox="1"/>
-          <p:nvPr/>
-        </p:nvSpPr>
-        <p:spPr>
-          <a:xfrm>
-            <a:off x="8537443" y="2656940"/>
-            <a:ext cx="2727434" cy="1200329"/>
-          </a:xfrm>
-          <a:prstGeom prst="rect">
-            <a:avLst/>
-          </a:prstGeom>
-        </p:spPr>
-        <p:style>
-          <a:lnRef idx="2">
-            <a:schemeClr val="accent3"/>
-          </a:lnRef>
-          <a:fillRef idx="1">
-            <a:schemeClr val="lt1"/>
-          </a:fillRef>
-          <a:effectRef idx="0">
-            <a:schemeClr val="accent3"/>
-          </a:effectRef>
-          <a:fontRef idx="minor">
-            <a:schemeClr val="dk1"/>
-          </a:fontRef>
-        </p:style>
-        <p:txBody>
-          <a:bodyPr wrap="square" rtlCol="0">
-            <a:spAutoFit/>
-          </a:bodyPr>
-          <a:lstStyle/>
-          <a:p>
-            <a:r>
-              <a:rPr lang="en-US" u="sng" dirty="0" smtClean="0"/>
-              <a:t>Welch Two Sample t-test</a:t>
-            </a:r>
-          </a:p>
-          <a:p>
-            <a:pPr marL="285750" indent="-285750">
-              <a:buFont typeface="Arial" panose="020B0604020202020204" pitchFamily="34" charset="0"/>
-              <a:buChar char="•"/>
-            </a:pPr>
-            <a:r>
-              <a:rPr lang="en-US" dirty="0" smtClean="0"/>
-              <a:t>p-value: 0.6</a:t>
-            </a:r>
-          </a:p>
-          <a:p>
-            <a:pPr marL="285750" indent="-285750">
-              <a:buFont typeface="Arial" panose="020B0604020202020204" pitchFamily="34" charset="0"/>
-              <a:buChar char="•"/>
-            </a:pPr>
-            <a:r>
-              <a:rPr lang="en-US" dirty="0" smtClean="0"/>
-              <a:t>Assist Mean</a:t>
-            </a:r>
-            <a:r>
-              <a:rPr lang="en-US" dirty="0"/>
-              <a:t>: 51.7</a:t>
-            </a:r>
-            <a:endParaRPr lang="en-US" dirty="0" smtClean="0"/>
-          </a:p>
-          <a:p>
-            <a:pPr marL="285750" indent="-285750">
-              <a:buFont typeface="Arial" panose="020B0604020202020204" pitchFamily="34" charset="0"/>
-              <a:buChar char="•"/>
-            </a:pPr>
-            <a:r>
-              <a:rPr lang="en-US" dirty="0" smtClean="0"/>
-              <a:t>Key Pass Mean</a:t>
-            </a:r>
-            <a:r>
-              <a:rPr lang="en-US" dirty="0"/>
-              <a:t>: 52.1</a:t>
-            </a:r>
+            <a:endParaRPr lang="en-US"/>
           </a:p>
         </p:txBody>
       </p:sp>
     </p:spTree>
     <p:extLst>
       <p:ext uri="{BB962C8B-B14F-4D97-AF65-F5344CB8AC3E}">
-        <p14:creationId xmlns:p14="http://schemas.microsoft.com/office/powerpoint/2010/main" val="2229208503"/>
+        <p14:creationId xmlns:p14="http://schemas.microsoft.com/office/powerpoint/2010/main" val="1980965102"/>
       </p:ext>
     </p:extLst>
   </p:cSld>
@@ -4195,7 +4391,7 @@
           <p:cNvPr id="2" name="TextBox 1">
             <a:extLst>
               <a:ext uri="{FF2B5EF4-FFF2-40B4-BE49-F238E27FC236}">
-                <a16:creationId xmlns:a16="http://schemas.microsoft.com/office/drawing/2014/main" xmlns="" id="{1E9E0E37-71F7-4506-A4A0-38A592F50849}"/>
+                <a16:creationId xmlns="" xmlns:a16="http://schemas.microsoft.com/office/drawing/2014/main" id="{1E9E0E37-71F7-4506-A4A0-38A592F50849}"/>
               </a:ext>
             </a:extLst>
           </p:cNvPr>
@@ -4205,7 +4401,7 @@
         <p:spPr>
           <a:xfrm>
             <a:off x="622571" y="291830"/>
-            <a:ext cx="5672130" cy="584775"/>
+            <a:ext cx="4799263" cy="584775"/>
           </a:xfrm>
           <a:prstGeom prst="rect">
             <a:avLst/>
@@ -4219,121 +4415,38 @@
           <a:lstStyle/>
           <a:p>
             <a:r>
+              <a:rPr lang="en-US" sz="3200" b="1" dirty="0" smtClean="0">
+                <a:solidFill>
+                  <a:srgbClr val="FF0000"/>
+                </a:solidFill>
+              </a:rPr>
+              <a:t>R</a:t>
+            </a:r>
+            <a:r>
               <a:rPr lang="en-US" sz="3200" b="1" dirty="0" smtClean="0"/>
-              <a:t>Hypothesis Testing: Shot </a:t>
-            </a:r>
-            <a:r>
-              <a:rPr lang="en-US" sz="3200" b="1" dirty="0" err="1" smtClean="0"/>
-              <a:t>vs</a:t>
+              <a:t> Hypothesis </a:t>
             </a:r>
             <a:r>
               <a:rPr lang="en-US" sz="3200" b="1" dirty="0" smtClean="0"/>
-              <a:t> Goal</a:t>
-            </a:r>
-            <a:endParaRPr lang="en-US" sz="3200" b="1" dirty="0"/>
-          </a:p>
-        </p:txBody>
-      </p:sp>
-      <p:pic>
-        <p:nvPicPr>
-          <p:cNvPr id="4" name="Picture 3"/>
-          <p:cNvPicPr>
-            <a:picLocks noChangeAspect="1"/>
-          </p:cNvPicPr>
+              <a:t>Testing Reca</a:t>
+            </a:r>
+            <a:r>
+              <a:rPr lang="en-US" sz="3200" b="1" dirty="0"/>
+              <a:t>p</a:t>
+            </a:r>
+          </a:p>
+        </p:txBody>
+      </p:sp>
+      <p:sp>
+        <p:nvSpPr>
+          <p:cNvPr id="8" name="TextBox 7"/>
+          <p:cNvSpPr txBox="1"/>
           <p:nvPr/>
-        </p:nvPicPr>
-        <p:blipFill>
-          <a:blip r:embed="rId2" cstate="print">
-            <a:extLst>
-              <a:ext uri="{28A0092B-C50C-407E-A947-70E740481C1C}">
-                <a14:useLocalDpi xmlns:a14="http://schemas.microsoft.com/office/drawing/2010/main" val="0"/>
-              </a:ext>
-            </a:extLst>
-          </a:blip>
-          <a:stretch>
-            <a:fillRect/>
-          </a:stretch>
-        </p:blipFill>
+        </p:nvSpPr>
         <p:spPr>
           <a:xfrm>
-            <a:off x="622571" y="3857269"/>
-            <a:ext cx="4528853" cy="2797027"/>
-          </a:xfrm>
-          <a:prstGeom prst="rect">
-            <a:avLst/>
-          </a:prstGeom>
-        </p:spPr>
-      </p:pic>
-      <p:pic>
-        <p:nvPicPr>
-          <p:cNvPr id="5" name="Picture 4"/>
-          <p:cNvPicPr>
-            <a:picLocks noChangeAspect="1"/>
-          </p:cNvPicPr>
-          <p:nvPr/>
-        </p:nvPicPr>
-        <p:blipFill>
-          <a:blip r:embed="rId3" cstate="print">
-            <a:extLst>
-              <a:ext uri="{28A0092B-C50C-407E-A947-70E740481C1C}">
-                <a14:useLocalDpi xmlns:a14="http://schemas.microsoft.com/office/drawing/2010/main" val="0"/>
-              </a:ext>
-            </a:extLst>
-          </a:blip>
-          <a:stretch>
-            <a:fillRect/>
-          </a:stretch>
-        </p:blipFill>
-        <p:spPr>
-          <a:xfrm>
-            <a:off x="3736695" y="908033"/>
-            <a:ext cx="4775304" cy="2949236"/>
-          </a:xfrm>
-          <a:prstGeom prst="rect">
-            <a:avLst/>
-          </a:prstGeom>
-        </p:spPr>
-      </p:pic>
-      <p:pic>
-        <p:nvPicPr>
-          <p:cNvPr id="7" name="Picture 6"/>
-          <p:cNvPicPr>
-            <a:picLocks noChangeAspect="1"/>
-          </p:cNvPicPr>
-          <p:nvPr/>
-        </p:nvPicPr>
-        <p:blipFill>
-          <a:blip r:embed="rId4" cstate="print">
-            <a:extLst>
-              <a:ext uri="{28A0092B-C50C-407E-A947-70E740481C1C}">
-                <a14:useLocalDpi xmlns:a14="http://schemas.microsoft.com/office/drawing/2010/main" val="0"/>
-              </a:ext>
-            </a:extLst>
-          </a:blip>
-          <a:stretch>
-            <a:fillRect/>
-          </a:stretch>
-        </p:blipFill>
-        <p:spPr>
-          <a:xfrm>
-            <a:off x="7104778" y="3861906"/>
-            <a:ext cx="4521345" cy="2792390"/>
-          </a:xfrm>
-          <a:prstGeom prst="rect">
-            <a:avLst/>
-          </a:prstGeom>
-        </p:spPr>
-      </p:pic>
-      <p:sp>
-        <p:nvSpPr>
-          <p:cNvPr id="6" name="TextBox 5"/>
-          <p:cNvSpPr txBox="1"/>
-          <p:nvPr/>
-        </p:nvSpPr>
-        <p:spPr>
-          <a:xfrm>
-            <a:off x="8537443" y="876605"/>
-            <a:ext cx="2727434" cy="1200329"/>
+            <a:off x="622571" y="876605"/>
+            <a:ext cx="5842654" cy="2031325"/>
           </a:xfrm>
           <a:prstGeom prst="rect">
             <a:avLst/>
@@ -4361,8 +4474,11 @@
           <a:p>
             <a:r>
               <a:rPr lang="en-US" u="sng" dirty="0" smtClean="0"/>
-              <a:t>Welch Two Sample t-test</a:t>
-            </a:r>
+              <a:t>Significant Difference in Means</a:t>
+            </a:r>
+          </a:p>
+          <a:p>
+            <a:endParaRPr lang="en-US" dirty="0"/>
           </a:p>
           <a:p>
             <a:pPr marL="285750" indent="-285750">
@@ -4370,20 +4486,8 @@
               <a:buChar char="•"/>
             </a:pPr>
             <a:r>
-              <a:rPr lang="en-US" dirty="0">
-                <a:solidFill>
-                  <a:srgbClr val="FF0000"/>
-                </a:solidFill>
-              </a:rPr>
-              <a:t>p-value: &lt;</a:t>
-            </a:r>
-            <a:r>
-              <a:rPr lang="en-US" dirty="0" smtClean="0">
-                <a:solidFill>
-                  <a:srgbClr val="FF0000"/>
-                </a:solidFill>
-              </a:rPr>
-              <a:t>2e-16</a:t>
+              <a:rPr lang="en-US" dirty="0"/>
+              <a:t>1. Assist v. Key Pass Distance (higher mean for key pass)</a:t>
             </a:r>
           </a:p>
           <a:p>
@@ -4392,8 +4496,8 @@
               <a:buChar char="•"/>
             </a:pPr>
             <a:r>
-              <a:rPr lang="en-US" dirty="0" smtClean="0"/>
-              <a:t>Goal Mean: 83.4</a:t>
+              <a:rPr lang="en-US" dirty="0"/>
+              <a:t>2. Goal v. Shot Distance (higher mean for goals)</a:t>
             </a:r>
           </a:p>
           <a:p>
@@ -4402,27 +4506,62 @@
               <a:buChar char="•"/>
             </a:pPr>
             <a:r>
+              <a:rPr lang="en-US" dirty="0"/>
+              <a:t>3. Goal v. Shot </a:t>
+            </a:r>
+            <a:r>
+              <a:rPr lang="en-US" dirty="0" err="1"/>
+              <a:t>x.Start</a:t>
+            </a:r>
+            <a:r>
+              <a:rPr lang="en-US" dirty="0"/>
+              <a:t> (higher mean for goals)</a:t>
+            </a:r>
+          </a:p>
+          <a:p>
+            <a:pPr marL="285750" indent="-285750">
+              <a:buFont typeface="Arial" panose="020B0604020202020204" pitchFamily="34" charset="0"/>
+              <a:buChar char="•"/>
+            </a:pPr>
+            <a:r>
+              <a:rPr lang="en-US" dirty="0"/>
+              <a:t>4. Goal v. Shot </a:t>
+            </a:r>
+            <a:r>
+              <a:rPr lang="en-US" dirty="0" err="1"/>
+              <a:t>y.Start</a:t>
+            </a:r>
+            <a:r>
+              <a:rPr lang="en-US" dirty="0"/>
+              <a:t> (higher mean for goals</a:t>
+            </a:r>
+            <a:r>
               <a:rPr lang="en-US" dirty="0" smtClean="0"/>
-              <a:t>Shot Mean: 78.6</a:t>
-            </a:r>
+              <a:t>)</a:t>
+            </a:r>
+          </a:p>
+          <a:p>
             <a:endParaRPr lang="en-US" dirty="0"/>
           </a:p>
         </p:txBody>
       </p:sp>
       <p:sp>
         <p:nvSpPr>
-          <p:cNvPr id="8" name="TextBox 7"/>
+          <p:cNvPr id="10" name="TextBox 9"/>
           <p:cNvSpPr txBox="1"/>
           <p:nvPr/>
         </p:nvSpPr>
         <p:spPr>
           <a:xfrm>
-            <a:off x="983815" y="2656941"/>
-            <a:ext cx="2727434" cy="1200329"/>
+            <a:off x="622571" y="3031040"/>
+            <a:ext cx="7053873" cy="923330"/>
           </a:xfrm>
           <a:prstGeom prst="rect">
             <a:avLst/>
           </a:prstGeom>
+          <a:ln>
+            <a:noFill/>
+          </a:ln>
         </p:spPr>
         <p:style>
           <a:lnRef idx="2">
@@ -4445,157 +4584,19 @@
           <a:lstStyle/>
           <a:p>
             <a:r>
-              <a:rPr lang="en-US" u="sng" dirty="0" smtClean="0"/>
-              <a:t>Welch Two Sample t-test</a:t>
-            </a:r>
-          </a:p>
-          <a:p>
-            <a:pPr marL="285750" indent="-285750">
-              <a:buFont typeface="Arial" panose="020B0604020202020204" pitchFamily="34" charset="0"/>
-              <a:buChar char="•"/>
-            </a:pPr>
-            <a:r>
-              <a:rPr lang="en-US" dirty="0" smtClean="0">
-                <a:solidFill>
-                  <a:srgbClr val="FF0000"/>
-                </a:solidFill>
-              </a:rPr>
-              <a:t>p-value</a:t>
-            </a:r>
-            <a:r>
-              <a:rPr lang="en-US" dirty="0">
-                <a:solidFill>
-                  <a:srgbClr val="FF0000"/>
-                </a:solidFill>
-              </a:rPr>
-              <a:t>: &lt;2e-16</a:t>
-            </a:r>
-            <a:endParaRPr lang="en-US" dirty="0" smtClean="0">
-              <a:solidFill>
-                <a:srgbClr val="FF0000"/>
-              </a:solidFill>
-            </a:endParaRPr>
-          </a:p>
-          <a:p>
-            <a:pPr marL="285750" indent="-285750">
-              <a:buFont typeface="Arial" panose="020B0604020202020204" pitchFamily="34" charset="0"/>
-              <a:buChar char="•"/>
-            </a:pPr>
-            <a:r>
               <a:rPr lang="en-US" dirty="0" smtClean="0"/>
-              <a:t>Goal Mean</a:t>
-            </a:r>
-            <a:r>
-              <a:rPr lang="en-US" dirty="0"/>
-              <a:t>: 93.5</a:t>
-            </a:r>
-            <a:endParaRPr lang="en-US" dirty="0" smtClean="0"/>
-          </a:p>
-          <a:p>
-            <a:pPr marL="285750" indent="-285750">
-              <a:buFont typeface="Arial" panose="020B0604020202020204" pitchFamily="34" charset="0"/>
-              <a:buChar char="•"/>
-            </a:pPr>
-            <a:r>
-              <a:rPr lang="en-US" dirty="0" smtClean="0"/>
-              <a:t>Shot Mean</a:t>
-            </a:r>
-            <a:r>
-              <a:rPr lang="en-US" dirty="0"/>
-              <a:t>: 84.3</a:t>
-            </a:r>
-          </a:p>
-        </p:txBody>
-      </p:sp>
-      <p:sp>
-        <p:nvSpPr>
-          <p:cNvPr id="9" name="TextBox 8"/>
-          <p:cNvSpPr txBox="1"/>
-          <p:nvPr/>
-        </p:nvSpPr>
-        <p:spPr>
-          <a:xfrm>
-            <a:off x="8537443" y="2656940"/>
-            <a:ext cx="2727434" cy="1200329"/>
-          </a:xfrm>
-          <a:prstGeom prst="rect">
-            <a:avLst/>
-          </a:prstGeom>
-        </p:spPr>
-        <p:style>
-          <a:lnRef idx="2">
-            <a:schemeClr val="accent3"/>
-          </a:lnRef>
-          <a:fillRef idx="1">
-            <a:schemeClr val="lt1"/>
-          </a:fillRef>
-          <a:effectRef idx="0">
-            <a:schemeClr val="accent3"/>
-          </a:effectRef>
-          <a:fontRef idx="minor">
-            <a:schemeClr val="dk1"/>
-          </a:fontRef>
-        </p:style>
-        <p:txBody>
-          <a:bodyPr wrap="square" rtlCol="0">
-            <a:spAutoFit/>
-          </a:bodyPr>
-          <a:lstStyle/>
-          <a:p>
-            <a:r>
-              <a:rPr lang="en-US" u="sng" dirty="0" smtClean="0"/>
-              <a:t>Welch Two Sample t-test</a:t>
-            </a:r>
-          </a:p>
-          <a:p>
-            <a:pPr marL="285750" indent="-285750">
-              <a:buFont typeface="Arial" panose="020B0604020202020204" pitchFamily="34" charset="0"/>
-              <a:buChar char="•"/>
-            </a:pPr>
-            <a:r>
-              <a:rPr lang="en-US" dirty="0" smtClean="0">
-                <a:solidFill>
-                  <a:srgbClr val="FF0000"/>
-                </a:solidFill>
-              </a:rPr>
-              <a:t>p-value: &lt;2e-16</a:t>
-            </a:r>
-          </a:p>
-          <a:p>
-            <a:pPr marL="285750" indent="-285750">
-              <a:buFont typeface="Arial" panose="020B0604020202020204" pitchFamily="34" charset="0"/>
-              <a:buChar char="•"/>
-            </a:pPr>
-            <a:r>
-              <a:rPr lang="en-US" dirty="0" smtClean="0"/>
-              <a:t>Goal Mean</a:t>
-            </a:r>
-            <a:r>
-              <a:rPr lang="en-US" dirty="0"/>
-              <a:t>: 68.1</a:t>
-            </a:r>
-            <a:endParaRPr lang="en-US" dirty="0" smtClean="0"/>
-          </a:p>
-          <a:p>
-            <a:pPr marL="285750" indent="-285750">
-              <a:buFont typeface="Arial" panose="020B0604020202020204" pitchFamily="34" charset="0"/>
-              <a:buChar char="•"/>
-            </a:pPr>
-            <a:r>
-              <a:rPr lang="en-US" dirty="0" smtClean="0"/>
-              <a:t>Shot Mean</a:t>
-            </a:r>
-            <a:r>
-              <a:rPr lang="en-US" dirty="0"/>
-              <a:t>: 49.2</a:t>
-            </a:r>
+              <a:t>Do teams differ in their strategies when it comes to the above variables? Let’s take a look at some Teams in the World Cup.</a:t>
+            </a:r>
+          </a:p>
+          <a:p>
+            <a:endParaRPr lang="en-US" dirty="0"/>
           </a:p>
         </p:txBody>
       </p:sp>
     </p:spTree>
     <p:extLst>
       <p:ext uri="{BB962C8B-B14F-4D97-AF65-F5344CB8AC3E}">
-        <p14:creationId xmlns:p14="http://schemas.microsoft.com/office/powerpoint/2010/main" val="2546947495"/>
+        <p14:creationId xmlns:p14="http://schemas.microsoft.com/office/powerpoint/2010/main" val="216769705"/>
       </p:ext>
     </p:extLst>
   </p:cSld>
@@ -4624,195 +4625,41 @@
       </p:grpSpPr>
       <p:sp>
         <p:nvSpPr>
-          <p:cNvPr id="2" name="TextBox 1">
-            <a:extLst>
-              <a:ext uri="{FF2B5EF4-FFF2-40B4-BE49-F238E27FC236}">
-                <a16:creationId xmlns:a16="http://schemas.microsoft.com/office/drawing/2014/main" xmlns="" id="{1E9E0E37-71F7-4506-A4A0-38A592F50849}"/>
-              </a:ext>
-            </a:extLst>
-          </p:cNvPr>
-          <p:cNvSpPr txBox="1"/>
-          <p:nvPr/>
-        </p:nvSpPr>
-        <p:spPr>
-          <a:xfrm>
-            <a:off x="622571" y="291830"/>
-            <a:ext cx="4475456" cy="584775"/>
-          </a:xfrm>
-          <a:prstGeom prst="rect">
-            <a:avLst/>
-          </a:prstGeom>
-          <a:noFill/>
-        </p:spPr>
-        <p:txBody>
-          <a:bodyPr wrap="none" rtlCol="0">
-            <a:spAutoFit/>
-          </a:bodyPr>
+          <p:cNvPr id="2" name="Title 1"/>
+          <p:cNvSpPr>
+            <a:spLocks noGrp="1"/>
+          </p:cNvSpPr>
+          <p:nvPr>
+            <p:ph type="ctrTitle"/>
+          </p:nvPr>
+        </p:nvSpPr>
+        <p:spPr/>
+        <p:txBody>
+          <a:bodyPr/>
           <a:lstStyle/>
           <a:p>
             <a:r>
-              <a:rPr lang="en-US" sz="3200" b="1" dirty="0" smtClean="0"/>
-              <a:t>Hypothesis Testing Reca</a:t>
-            </a:r>
-            <a:r>
-              <a:rPr lang="en-US" sz="3200" b="1" dirty="0"/>
-              <a:t>p</a:t>
-            </a:r>
-            <a:endParaRPr lang="en-US" sz="3200" b="1" dirty="0"/>
-          </a:p>
-        </p:txBody>
-      </p:sp>
-      <p:sp>
-        <p:nvSpPr>
-          <p:cNvPr id="8" name="TextBox 7"/>
-          <p:cNvSpPr txBox="1"/>
-          <p:nvPr/>
-        </p:nvSpPr>
-        <p:spPr>
-          <a:xfrm>
-            <a:off x="622571" y="876605"/>
-            <a:ext cx="5842654" cy="2031325"/>
-          </a:xfrm>
-          <a:prstGeom prst="rect">
-            <a:avLst/>
-          </a:prstGeom>
-        </p:spPr>
-        <p:style>
-          <a:lnRef idx="2">
-            <a:schemeClr val="accent3"/>
-          </a:lnRef>
-          <a:fillRef idx="1">
-            <a:schemeClr val="lt1"/>
-          </a:fillRef>
-          <a:effectRef idx="0">
-            <a:schemeClr val="accent3"/>
-          </a:effectRef>
-          <a:fontRef idx="minor">
-            <a:schemeClr val="dk1"/>
-          </a:fontRef>
-        </p:style>
-        <p:txBody>
-          <a:bodyPr wrap="square" rtlCol="0">
-            <a:spAutoFit/>
-          </a:bodyPr>
+              <a:rPr lang="en-US" dirty="0" smtClean="0"/>
+              <a:t>In progress. World Cup Boxplots and ANOVA (Rose)</a:t>
+            </a:r>
+            <a:endParaRPr lang="en-US" dirty="0"/>
+          </a:p>
+        </p:txBody>
+      </p:sp>
+      <p:sp>
+        <p:nvSpPr>
+          <p:cNvPr id="3" name="Subtitle 2"/>
+          <p:cNvSpPr>
+            <a:spLocks noGrp="1"/>
+          </p:cNvSpPr>
+          <p:nvPr>
+            <p:ph type="subTitle" idx="1"/>
+          </p:nvPr>
+        </p:nvSpPr>
+        <p:spPr/>
+        <p:txBody>
+          <a:bodyPr/>
           <a:lstStyle/>
-          <a:p>
-            <a:r>
-              <a:rPr lang="en-US" u="sng" dirty="0" smtClean="0"/>
-              <a:t>Significant Difference in Means</a:t>
-            </a:r>
-          </a:p>
-          <a:p>
-            <a:endParaRPr lang="en-US" dirty="0"/>
-          </a:p>
-          <a:p>
-            <a:pPr marL="285750" indent="-285750">
-              <a:buFont typeface="Arial" panose="020B0604020202020204" pitchFamily="34" charset="0"/>
-              <a:buChar char="•"/>
-            </a:pPr>
-            <a:r>
-              <a:rPr lang="en-US" dirty="0"/>
-              <a:t>1. Assist v. Key Pass Distance (higher mean for key pass)</a:t>
-            </a:r>
-          </a:p>
-          <a:p>
-            <a:pPr marL="285750" indent="-285750">
-              <a:buFont typeface="Arial" panose="020B0604020202020204" pitchFamily="34" charset="0"/>
-              <a:buChar char="•"/>
-            </a:pPr>
-            <a:r>
-              <a:rPr lang="en-US" dirty="0"/>
-              <a:t>2. Goal v. Shot Distance (higher mean for goals)</a:t>
-            </a:r>
-          </a:p>
-          <a:p>
-            <a:pPr marL="285750" indent="-285750">
-              <a:buFont typeface="Arial" panose="020B0604020202020204" pitchFamily="34" charset="0"/>
-              <a:buChar char="•"/>
-            </a:pPr>
-            <a:r>
-              <a:rPr lang="en-US" dirty="0"/>
-              <a:t>3. Goal v. Shot </a:t>
-            </a:r>
-            <a:r>
-              <a:rPr lang="en-US" dirty="0" err="1"/>
-              <a:t>x.Start</a:t>
-            </a:r>
-            <a:r>
-              <a:rPr lang="en-US" dirty="0"/>
-              <a:t> (higher mean for goals)</a:t>
-            </a:r>
-          </a:p>
-          <a:p>
-            <a:pPr marL="285750" indent="-285750">
-              <a:buFont typeface="Arial" panose="020B0604020202020204" pitchFamily="34" charset="0"/>
-              <a:buChar char="•"/>
-            </a:pPr>
-            <a:r>
-              <a:rPr lang="en-US" dirty="0"/>
-              <a:t>4. Goal v. Shot </a:t>
-            </a:r>
-            <a:r>
-              <a:rPr lang="en-US" dirty="0" err="1"/>
-              <a:t>y.Start</a:t>
-            </a:r>
-            <a:r>
-              <a:rPr lang="en-US" dirty="0"/>
-              <a:t> (higher mean for goals</a:t>
-            </a:r>
-            <a:r>
-              <a:rPr lang="en-US" dirty="0" smtClean="0"/>
-              <a:t>)</a:t>
-            </a:r>
-          </a:p>
-          <a:p>
-            <a:endParaRPr lang="en-US" dirty="0"/>
-          </a:p>
-        </p:txBody>
-      </p:sp>
-      <p:sp>
-        <p:nvSpPr>
-          <p:cNvPr id="10" name="TextBox 9"/>
-          <p:cNvSpPr txBox="1"/>
-          <p:nvPr/>
-        </p:nvSpPr>
-        <p:spPr>
-          <a:xfrm>
-            <a:off x="622571" y="3031040"/>
-            <a:ext cx="7053873" cy="923330"/>
-          </a:xfrm>
-          <a:prstGeom prst="rect">
-            <a:avLst/>
-          </a:prstGeom>
-          <a:ln>
-            <a:noFill/>
-          </a:ln>
-        </p:spPr>
-        <p:style>
-          <a:lnRef idx="2">
-            <a:schemeClr val="accent3"/>
-          </a:lnRef>
-          <a:fillRef idx="1">
-            <a:schemeClr val="lt1"/>
-          </a:fillRef>
-          <a:effectRef idx="0">
-            <a:schemeClr val="accent3"/>
-          </a:effectRef>
-          <a:fontRef idx="minor">
-            <a:schemeClr val="dk1"/>
-          </a:fontRef>
-        </p:style>
-        <p:txBody>
-          <a:bodyPr wrap="square" rtlCol="0">
-            <a:spAutoFit/>
-          </a:bodyPr>
-          <a:lstStyle/>
-          <a:p>
-            <a:r>
-              <a:rPr lang="en-US" dirty="0" smtClean="0"/>
-              <a:t>Do teams differ in their strategies when it comes to the above variables? Let’s take a look at some Teams in the World Cup.</a:t>
-            </a:r>
-          </a:p>
           <a:p>
             <a:endParaRPr lang="en-US" dirty="0"/>
           </a:p>
@@ -4821,7 +4668,7 @@
     </p:spTree>
     <p:extLst>
       <p:ext uri="{BB962C8B-B14F-4D97-AF65-F5344CB8AC3E}">
-        <p14:creationId xmlns:p14="http://schemas.microsoft.com/office/powerpoint/2010/main" val="216769705"/>
+        <p14:creationId xmlns:p14="http://schemas.microsoft.com/office/powerpoint/2010/main" val="688625921"/>
       </p:ext>
     </p:extLst>
   </p:cSld>
@@ -4850,50 +4697,155 @@
       </p:grpSpPr>
       <p:sp>
         <p:nvSpPr>
-          <p:cNvPr id="2" name="Title 1"/>
-          <p:cNvSpPr>
-            <a:spLocks noGrp="1"/>
-          </p:cNvSpPr>
-          <p:nvPr>
-            <p:ph type="ctrTitle"/>
-          </p:nvPr>
-        </p:nvSpPr>
-        <p:spPr/>
-        <p:txBody>
-          <a:bodyPr/>
+          <p:cNvPr id="2" name="TextBox 1">
+            <a:extLst>
+              <a:ext uri="{FF2B5EF4-FFF2-40B4-BE49-F238E27FC236}">
+                <a16:creationId xmlns="" xmlns:a16="http://schemas.microsoft.com/office/drawing/2014/main" id="{403E5C2C-0B2A-40B0-B292-DFBFD50F3A00}"/>
+              </a:ext>
+            </a:extLst>
+          </p:cNvPr>
+          <p:cNvSpPr txBox="1"/>
+          <p:nvPr/>
+        </p:nvSpPr>
+        <p:spPr>
+          <a:xfrm>
+            <a:off x="612739" y="213172"/>
+            <a:ext cx="2318263" cy="584775"/>
+          </a:xfrm>
+          <a:prstGeom prst="rect">
+            <a:avLst/>
+          </a:prstGeom>
+          <a:noFill/>
+        </p:spPr>
+        <p:txBody>
+          <a:bodyPr wrap="none" rtlCol="0">
+            <a:spAutoFit/>
+          </a:bodyPr>
           <a:lstStyle/>
           <a:p>
             <a:r>
+              <a:rPr lang="en-US" sz="3200" b="1" dirty="0"/>
+              <a:t>Conclusions:</a:t>
+            </a:r>
+          </a:p>
+        </p:txBody>
+      </p:sp>
+      <p:sp>
+        <p:nvSpPr>
+          <p:cNvPr id="3" name="Rectangle 2"/>
+          <p:cNvSpPr/>
+          <p:nvPr/>
+        </p:nvSpPr>
+        <p:spPr>
+          <a:xfrm>
+            <a:off x="612739" y="797947"/>
+            <a:ext cx="6096000" cy="3139321"/>
+          </a:xfrm>
+          <a:prstGeom prst="rect">
+            <a:avLst/>
+          </a:prstGeom>
+        </p:spPr>
+        <p:txBody>
+          <a:bodyPr>
+            <a:spAutoFit/>
+          </a:bodyPr>
+          <a:lstStyle/>
+          <a:p>
+            <a:r>
+              <a:rPr lang="en-US" dirty="0"/>
+              <a:t>Concluding Statement: </a:t>
+            </a:r>
+            <a:endParaRPr lang="en-US" dirty="0" smtClean="0"/>
+          </a:p>
+          <a:p>
+            <a:r>
               <a:rPr lang="en-US" dirty="0" smtClean="0"/>
-              <a:t>In progress. World Cup Boxplots and ANOVA (Rose)</a:t>
-            </a:r>
+              <a:t>Based </a:t>
+            </a:r>
+            <a:r>
+              <a:rPr lang="en-US" dirty="0"/>
+              <a:t>on t-tests done between Shots </a:t>
+            </a:r>
+            <a:r>
+              <a:rPr lang="en-US" dirty="0" err="1"/>
+              <a:t>vs</a:t>
+            </a:r>
+            <a:r>
+              <a:rPr lang="en-US" dirty="0"/>
+              <a:t> Goals, and Assists </a:t>
+            </a:r>
+            <a:r>
+              <a:rPr lang="en-US" dirty="0" err="1"/>
+              <a:t>vs</a:t>
+            </a:r>
+            <a:r>
+              <a:rPr lang="en-US" dirty="0"/>
+              <a:t> Key Passes, there is evidence of distance and start coordinate differences between successful and unsuccessful plays. </a:t>
+            </a:r>
+            <a:endParaRPr lang="en-US" dirty="0" smtClean="0"/>
+          </a:p>
+          <a:p>
+            <a:endParaRPr lang="en-US" dirty="0" smtClean="0"/>
+          </a:p>
+          <a:p>
+            <a:r>
+              <a:rPr lang="en-US" dirty="0"/>
+              <a:t>Success </a:t>
+            </a:r>
+            <a:r>
+              <a:rPr lang="en-US" dirty="0" smtClean="0"/>
+              <a:t>probabilities </a:t>
+            </a:r>
+            <a:r>
+              <a:rPr lang="en-US" b="1" dirty="0" smtClean="0">
+                <a:solidFill>
+                  <a:srgbClr val="FF0000"/>
+                </a:solidFill>
+              </a:rPr>
+              <a:t>(M)</a:t>
+            </a:r>
+            <a:endParaRPr lang="en-US" b="1" dirty="0">
+              <a:solidFill>
+                <a:srgbClr val="FF0000"/>
+              </a:solidFill>
+            </a:endParaRPr>
+          </a:p>
+          <a:p>
             <a:endParaRPr lang="en-US" dirty="0"/>
           </a:p>
-        </p:txBody>
-      </p:sp>
-      <p:sp>
-        <p:nvSpPr>
-          <p:cNvPr id="3" name="Subtitle 2"/>
-          <p:cNvSpPr>
-            <a:spLocks noGrp="1"/>
-          </p:cNvSpPr>
-          <p:nvPr>
-            <p:ph type="subTitle" idx="1"/>
-          </p:nvPr>
-        </p:nvSpPr>
-        <p:spPr/>
-        <p:txBody>
-          <a:bodyPr/>
-          <a:lstStyle/>
-          <a:p>
-            <a:endParaRPr lang="en-US" dirty="0"/>
+          <a:p>
+            <a:r>
+              <a:rPr lang="en-US" dirty="0" smtClean="0"/>
+              <a:t>Applying </a:t>
+            </a:r>
+            <a:r>
+              <a:rPr lang="en-US" dirty="0"/>
+              <a:t>this finding to the top 5 teams in the World Cup, we see further that there are teams that are significantly different in their tendencies for distance and </a:t>
+            </a:r>
+            <a:r>
+              <a:rPr lang="en-US" dirty="0" err="1"/>
+              <a:t>Y.Start</a:t>
+            </a:r>
+            <a:r>
+              <a:rPr lang="en-US" dirty="0"/>
+              <a:t> when it comes to attempting a </a:t>
+            </a:r>
+            <a:r>
+              <a:rPr lang="en-US" dirty="0" smtClean="0"/>
+              <a:t>goal</a:t>
+            </a:r>
+            <a:r>
+              <a:rPr lang="en-US" dirty="0"/>
+              <a:t>.</a:t>
+            </a:r>
+            <a:endParaRPr lang="en-US" dirty="0" smtClean="0"/>
           </a:p>
         </p:txBody>
       </p:sp>
     </p:spTree>
     <p:extLst>
       <p:ext uri="{BB962C8B-B14F-4D97-AF65-F5344CB8AC3E}">
-        <p14:creationId xmlns:p14="http://schemas.microsoft.com/office/powerpoint/2010/main" val="688625921"/>
+        <p14:creationId xmlns:p14="http://schemas.microsoft.com/office/powerpoint/2010/main" val="2545738835"/>
       </p:ext>
     </p:extLst>
   </p:cSld>
@@ -4922,43 +4874,85 @@
       </p:grpSpPr>
       <p:sp>
         <p:nvSpPr>
-          <p:cNvPr id="2" name="TextBox 1">
-            <a:extLst>
-              <a:ext uri="{FF2B5EF4-FFF2-40B4-BE49-F238E27FC236}">
-                <a16:creationId xmlns:a16="http://schemas.microsoft.com/office/drawing/2014/main" xmlns="" id="{403E5C2C-0B2A-40B0-B292-DFBFD50F3A00}"/>
-              </a:ext>
-            </a:extLst>
-          </p:cNvPr>
-          <p:cNvSpPr txBox="1"/>
-          <p:nvPr/>
+          <p:cNvPr id="2" name="Title 1"/>
+          <p:cNvSpPr>
+            <a:spLocks noGrp="1"/>
+          </p:cNvSpPr>
+          <p:nvPr>
+            <p:ph type="title"/>
+          </p:nvPr>
+        </p:nvSpPr>
+        <p:spPr/>
+        <p:txBody>
+          <a:bodyPr/>
+          <a:lstStyle/>
+          <a:p>
+            <a:r>
+              <a:rPr lang="en-US" dirty="0" smtClean="0"/>
+              <a:t>Next steps</a:t>
+            </a:r>
+            <a:endParaRPr lang="en-US" dirty="0"/>
+          </a:p>
+        </p:txBody>
+      </p:sp>
+      <p:sp>
+        <p:nvSpPr>
+          <p:cNvPr id="3" name="Content Placeholder 2"/>
+          <p:cNvSpPr>
+            <a:spLocks noGrp="1"/>
+          </p:cNvSpPr>
+          <p:nvPr>
+            <p:ph idx="1"/>
+          </p:nvPr>
         </p:nvSpPr>
         <p:spPr>
           <a:xfrm>
-            <a:off x="612739" y="213172"/>
-            <a:ext cx="2318263" cy="584775"/>
+            <a:off x="838200" y="1690688"/>
+            <a:ext cx="10515600" cy="4351338"/>
           </a:xfrm>
-          <a:prstGeom prst="rect">
-            <a:avLst/>
-          </a:prstGeom>
-          <a:noFill/>
         </p:spPr>
         <p:txBody>
-          <a:bodyPr wrap="none" rtlCol="0">
-            <a:spAutoFit/>
-          </a:bodyPr>
+          <a:bodyPr/>
           <a:lstStyle/>
           <a:p>
             <a:r>
-              <a:rPr lang="en-US" sz="3200" b="1" dirty="0"/>
-              <a:t>Conclusions:</a:t>
-            </a:r>
+              <a:rPr lang="en-US" dirty="0" smtClean="0"/>
+              <a:t>Adjust fitting to better account for non-normal distributions</a:t>
+            </a:r>
+          </a:p>
+          <a:p>
+            <a:r>
+              <a:rPr lang="en-US" dirty="0" smtClean="0"/>
+              <a:t>Further exploration of data by groups (by league, </a:t>
+            </a:r>
+            <a:r>
+              <a:rPr lang="en-US" dirty="0" err="1" smtClean="0"/>
+              <a:t>etc</a:t>
+            </a:r>
+            <a:r>
+              <a:rPr lang="en-US" dirty="0" smtClean="0"/>
+              <a:t>?)</a:t>
+            </a:r>
+          </a:p>
+          <a:p>
+            <a:r>
+              <a:rPr lang="en-US" dirty="0" smtClean="0"/>
+              <a:t>Improving visualizations (3D plots)</a:t>
+            </a:r>
+          </a:p>
+          <a:p>
+            <a:r>
+              <a:rPr lang="en-US" dirty="0" smtClean="0"/>
+              <a:t>Linear model</a:t>
+            </a:r>
+            <a:endParaRPr lang="en-US" dirty="0"/>
           </a:p>
         </p:txBody>
       </p:sp>
     </p:spTree>
     <p:extLst>
       <p:ext uri="{BB962C8B-B14F-4D97-AF65-F5344CB8AC3E}">
-        <p14:creationId xmlns:p14="http://schemas.microsoft.com/office/powerpoint/2010/main" val="2545738835"/>
+        <p14:creationId xmlns:p14="http://schemas.microsoft.com/office/powerpoint/2010/main" val="3786968516"/>
       </p:ext>
     </p:extLst>
   </p:cSld>
@@ -4990,7 +4984,7 @@
           <p:cNvPr id="2" name="TextBox 1">
             <a:extLst>
               <a:ext uri="{FF2B5EF4-FFF2-40B4-BE49-F238E27FC236}">
-                <a16:creationId xmlns:a16="http://schemas.microsoft.com/office/drawing/2014/main" xmlns="" id="{6E7F4BA1-E473-4273-8CC9-9A5E056A5317}"/>
+                <a16:creationId xmlns="" xmlns:a16="http://schemas.microsoft.com/office/drawing/2014/main" id="{6E7F4BA1-E473-4273-8CC9-9A5E056A5317}"/>
               </a:ext>
             </a:extLst>
           </p:cNvPr>
@@ -5000,7 +4994,7 @@
         <p:spPr>
           <a:xfrm>
             <a:off x="622571" y="291830"/>
-            <a:ext cx="3451586" cy="584775"/>
+            <a:ext cx="3805850" cy="584775"/>
           </a:xfrm>
           <a:prstGeom prst="rect">
             <a:avLst/>
@@ -5014,8 +5008,20 @@
           <a:lstStyle/>
           <a:p>
             <a:r>
+              <a:rPr lang="en-US" sz="3200" b="1" dirty="0" smtClean="0">
+                <a:solidFill>
+                  <a:srgbClr val="FF0000"/>
+                </a:solidFill>
+              </a:rPr>
+              <a:t>G</a:t>
+            </a:r>
+            <a:r>
+              <a:rPr lang="en-US" sz="3200" b="1" dirty="0" smtClean="0"/>
+              <a:t> Data </a:t>
+            </a:r>
+            <a:r>
               <a:rPr lang="en-US" sz="3200" b="1" dirty="0"/>
-              <a:t>Data Set Overview:</a:t>
+              <a:t>Set Overview:</a:t>
             </a:r>
           </a:p>
         </p:txBody>
@@ -5025,7 +5031,7 @@
           <p:cNvPr id="3" name="TextBox 2">
             <a:extLst>
               <a:ext uri="{FF2B5EF4-FFF2-40B4-BE49-F238E27FC236}">
-                <a16:creationId xmlns:a16="http://schemas.microsoft.com/office/drawing/2014/main" xmlns="" id="{D1D0B343-EC0E-4FE5-8A83-97DB22C2B0FE}"/>
+                <a16:creationId xmlns="" xmlns:a16="http://schemas.microsoft.com/office/drawing/2014/main" id="{D1D0B343-EC0E-4FE5-8A83-97DB22C2B0FE}"/>
               </a:ext>
             </a:extLst>
           </p:cNvPr>
@@ -5060,7 +5066,7 @@
           <p:cNvPr id="4" name="TextBox 3">
             <a:extLst>
               <a:ext uri="{FF2B5EF4-FFF2-40B4-BE49-F238E27FC236}">
-                <a16:creationId xmlns:a16="http://schemas.microsoft.com/office/drawing/2014/main" xmlns="" id="{690C2353-02BE-4642-85DA-78D14370A180}"/>
+                <a16:creationId xmlns="" xmlns:a16="http://schemas.microsoft.com/office/drawing/2014/main" id="{690C2353-02BE-4642-85DA-78D14370A180}"/>
               </a:ext>
             </a:extLst>
           </p:cNvPr>
@@ -5095,7 +5101,7 @@
           <p:cNvPr id="5" name="TextBox 4">
             <a:extLst>
               <a:ext uri="{FF2B5EF4-FFF2-40B4-BE49-F238E27FC236}">
-                <a16:creationId xmlns:a16="http://schemas.microsoft.com/office/drawing/2014/main" xmlns="" id="{C2F07132-D448-4C15-9BFB-E87670F5C6FE}"/>
+                <a16:creationId xmlns="" xmlns:a16="http://schemas.microsoft.com/office/drawing/2014/main" id="{C2F07132-D448-4C15-9BFB-E87670F5C6FE}"/>
               </a:ext>
             </a:extLst>
           </p:cNvPr>
@@ -5130,7 +5136,7 @@
           <p:cNvPr id="6" name="Rectangle: Rounded Corners 5">
             <a:extLst>
               <a:ext uri="{FF2B5EF4-FFF2-40B4-BE49-F238E27FC236}">
-                <a16:creationId xmlns:a16="http://schemas.microsoft.com/office/drawing/2014/main" xmlns="" id="{CD032F2B-AAF7-4DFA-B443-0EC9EF882280}"/>
+                <a16:creationId xmlns="" xmlns:a16="http://schemas.microsoft.com/office/drawing/2014/main" id="{CD032F2B-AAF7-4DFA-B443-0EC9EF882280}"/>
               </a:ext>
             </a:extLst>
           </p:cNvPr>
@@ -5152,7 +5158,7 @@
                   <a14:useLocalDpi xmlns:a14="http://schemas.microsoft.com/office/drawing/2010/main" val="0"/>
                 </a:ext>
                 <a:ext uri="{837473B0-CC2E-450A-ABE3-18F120FF3D39}">
-                  <a1611:picAttrSrcUrl xmlns:a1611="http://schemas.microsoft.com/office/drawing/2016/11/main" xmlns="" r:id="rId3"/>
+                  <a1611:picAttrSrcUrl xmlns="" xmlns:a1611="http://schemas.microsoft.com/office/drawing/2016/11/main" r:id="rId3"/>
                 </a:ext>
               </a:extLst>
             </a:blip>
@@ -5201,7 +5207,7 @@
           <p:cNvPr id="7" name="Rectangle: Rounded Corners 6">
             <a:extLst>
               <a:ext uri="{FF2B5EF4-FFF2-40B4-BE49-F238E27FC236}">
-                <a16:creationId xmlns:a16="http://schemas.microsoft.com/office/drawing/2014/main" xmlns="" id="{47E4AC7D-DEB2-41F7-BE71-AA4A58F596CC}"/>
+                <a16:creationId xmlns="" xmlns:a16="http://schemas.microsoft.com/office/drawing/2014/main" id="{47E4AC7D-DEB2-41F7-BE71-AA4A58F596CC}"/>
               </a:ext>
             </a:extLst>
           </p:cNvPr>
@@ -5223,7 +5229,7 @@
                   <a14:useLocalDpi xmlns:a14="http://schemas.microsoft.com/office/drawing/2010/main" val="0"/>
                 </a:ext>
                 <a:ext uri="{837473B0-CC2E-450A-ABE3-18F120FF3D39}">
-                  <a1611:picAttrSrcUrl xmlns:a1611="http://schemas.microsoft.com/office/drawing/2016/11/main" xmlns="" r:id="rId5"/>
+                  <a1611:picAttrSrcUrl xmlns="" xmlns:a1611="http://schemas.microsoft.com/office/drawing/2016/11/main" r:id="rId5"/>
                 </a:ext>
               </a:extLst>
             </a:blip>
@@ -5272,7 +5278,7 @@
           <p:cNvPr id="8" name="Rectangle: Rounded Corners 7">
             <a:extLst>
               <a:ext uri="{FF2B5EF4-FFF2-40B4-BE49-F238E27FC236}">
-                <a16:creationId xmlns:a16="http://schemas.microsoft.com/office/drawing/2014/main" xmlns="" id="{568076BC-B447-45DD-BFFC-78D227B93316}"/>
+                <a16:creationId xmlns="" xmlns:a16="http://schemas.microsoft.com/office/drawing/2014/main" id="{568076BC-B447-45DD-BFFC-78D227B93316}"/>
               </a:ext>
             </a:extLst>
           </p:cNvPr>
@@ -5294,7 +5300,7 @@
                   <a14:useLocalDpi xmlns:a14="http://schemas.microsoft.com/office/drawing/2010/main" val="0"/>
                 </a:ext>
                 <a:ext uri="{837473B0-CC2E-450A-ABE3-18F120FF3D39}">
-                  <a1611:picAttrSrcUrl xmlns:a1611="http://schemas.microsoft.com/office/drawing/2016/11/main" xmlns="" r:id="rId7"/>
+                  <a1611:picAttrSrcUrl xmlns="" xmlns:a1611="http://schemas.microsoft.com/office/drawing/2016/11/main" r:id="rId7"/>
                 </a:ext>
               </a:extLst>
             </a:blip>
@@ -5343,7 +5349,7 @@
           <p:cNvPr id="9" name="Rectangle: Rounded Corners 8">
             <a:extLst>
               <a:ext uri="{FF2B5EF4-FFF2-40B4-BE49-F238E27FC236}">
-                <a16:creationId xmlns:a16="http://schemas.microsoft.com/office/drawing/2014/main" xmlns="" id="{A1CA3B86-5D81-4A62-90E7-6A692B96B779}"/>
+                <a16:creationId xmlns="" xmlns:a16="http://schemas.microsoft.com/office/drawing/2014/main" id="{A1CA3B86-5D81-4A62-90E7-6A692B96B779}"/>
               </a:ext>
             </a:extLst>
           </p:cNvPr>
@@ -5365,7 +5371,7 @@
                   <a14:useLocalDpi xmlns:a14="http://schemas.microsoft.com/office/drawing/2010/main" val="0"/>
                 </a:ext>
                 <a:ext uri="{837473B0-CC2E-450A-ABE3-18F120FF3D39}">
-                  <a1611:picAttrSrcUrl xmlns:a1611="http://schemas.microsoft.com/office/drawing/2016/11/main" xmlns="" r:id="rId9"/>
+                  <a1611:picAttrSrcUrl xmlns="" xmlns:a1611="http://schemas.microsoft.com/office/drawing/2016/11/main" r:id="rId9"/>
                 </a:ext>
               </a:extLst>
             </a:blip>
@@ -5414,7 +5420,7 @@
           <p:cNvPr id="10" name="Rectangle: Rounded Corners 9">
             <a:extLst>
               <a:ext uri="{FF2B5EF4-FFF2-40B4-BE49-F238E27FC236}">
-                <a16:creationId xmlns:a16="http://schemas.microsoft.com/office/drawing/2014/main" xmlns="" id="{861CD96B-41CB-4C57-AFE0-DFC936A9912D}"/>
+                <a16:creationId xmlns="" xmlns:a16="http://schemas.microsoft.com/office/drawing/2014/main" id="{861CD96B-41CB-4C57-AFE0-DFC936A9912D}"/>
               </a:ext>
             </a:extLst>
           </p:cNvPr>
@@ -5436,7 +5442,7 @@
                   <a14:useLocalDpi xmlns:a14="http://schemas.microsoft.com/office/drawing/2010/main" val="0"/>
                 </a:ext>
                 <a:ext uri="{837473B0-CC2E-450A-ABE3-18F120FF3D39}">
-                  <a1611:picAttrSrcUrl xmlns:a1611="http://schemas.microsoft.com/office/drawing/2016/11/main" xmlns="" r:id="rId11"/>
+                  <a1611:picAttrSrcUrl xmlns="" xmlns:a1611="http://schemas.microsoft.com/office/drawing/2016/11/main" r:id="rId11"/>
                 </a:ext>
               </a:extLst>
             </a:blip>
@@ -5485,7 +5491,7 @@
           <p:cNvPr id="11" name="Rectangle: Rounded Corners 10">
             <a:extLst>
               <a:ext uri="{FF2B5EF4-FFF2-40B4-BE49-F238E27FC236}">
-                <a16:creationId xmlns:a16="http://schemas.microsoft.com/office/drawing/2014/main" xmlns="" id="{A049D730-445B-41E1-8D86-1636E53E014B}"/>
+                <a16:creationId xmlns="" xmlns:a16="http://schemas.microsoft.com/office/drawing/2014/main" id="{A049D730-445B-41E1-8D86-1636E53E014B}"/>
               </a:ext>
             </a:extLst>
           </p:cNvPr>
@@ -5507,7 +5513,7 @@
                   <a14:useLocalDpi xmlns:a14="http://schemas.microsoft.com/office/drawing/2010/main" val="0"/>
                 </a:ext>
                 <a:ext uri="{837473B0-CC2E-450A-ABE3-18F120FF3D39}">
-                  <a1611:picAttrSrcUrl xmlns:a1611="http://schemas.microsoft.com/office/drawing/2016/11/main" xmlns="" r:id="rId13"/>
+                  <a1611:picAttrSrcUrl xmlns="" xmlns:a1611="http://schemas.microsoft.com/office/drawing/2016/11/main" r:id="rId13"/>
                 </a:ext>
               </a:extLst>
             </a:blip>
@@ -5556,7 +5562,7 @@
           <p:cNvPr id="12" name="Rectangle: Rounded Corners 11">
             <a:extLst>
               <a:ext uri="{FF2B5EF4-FFF2-40B4-BE49-F238E27FC236}">
-                <a16:creationId xmlns:a16="http://schemas.microsoft.com/office/drawing/2014/main" xmlns="" id="{8F16978B-7F5F-4B30-94AA-AC679B3F6D91}"/>
+                <a16:creationId xmlns="" xmlns:a16="http://schemas.microsoft.com/office/drawing/2014/main" id="{8F16978B-7F5F-4B30-94AA-AC679B3F6D91}"/>
               </a:ext>
             </a:extLst>
           </p:cNvPr>
@@ -5578,7 +5584,7 @@
                   <a14:useLocalDpi xmlns:a14="http://schemas.microsoft.com/office/drawing/2010/main" val="0"/>
                 </a:ext>
                 <a:ext uri="{837473B0-CC2E-450A-ABE3-18F120FF3D39}">
-                  <a1611:picAttrSrcUrl xmlns:a1611="http://schemas.microsoft.com/office/drawing/2016/11/main" xmlns="" r:id="rId15"/>
+                  <a1611:picAttrSrcUrl xmlns="" xmlns:a1611="http://schemas.microsoft.com/office/drawing/2016/11/main" r:id="rId15"/>
                 </a:ext>
               </a:extLst>
             </a:blip>
@@ -5627,7 +5633,7 @@
           <p:cNvPr id="17" name="Group 16">
             <a:extLst>
               <a:ext uri="{FF2B5EF4-FFF2-40B4-BE49-F238E27FC236}">
-                <a16:creationId xmlns:a16="http://schemas.microsoft.com/office/drawing/2014/main" xmlns="" id="{C0ECEAF2-7E40-4D12-B72E-5EBB28CDE8E7}"/>
+                <a16:creationId xmlns="" xmlns:a16="http://schemas.microsoft.com/office/drawing/2014/main" id="{C0ECEAF2-7E40-4D12-B72E-5EBB28CDE8E7}"/>
               </a:ext>
             </a:extLst>
           </p:cNvPr>
@@ -5647,7 +5653,7 @@
             <p:cNvPr id="13" name="Rectangle: Rounded Corners 12">
               <a:extLst>
                 <a:ext uri="{FF2B5EF4-FFF2-40B4-BE49-F238E27FC236}">
-                  <a16:creationId xmlns:a16="http://schemas.microsoft.com/office/drawing/2014/main" xmlns="" id="{EEDEE5DB-1CA9-4D70-9B97-B9CF2D1B27C4}"/>
+                  <a16:creationId xmlns="" xmlns:a16="http://schemas.microsoft.com/office/drawing/2014/main" id="{EEDEE5DB-1CA9-4D70-9B97-B9CF2D1B27C4}"/>
                 </a:ext>
               </a:extLst>
             </p:cNvPr>
@@ -5695,7 +5701,7 @@
             <p:cNvPr id="14" name="TextBox 13">
               <a:extLst>
                 <a:ext uri="{FF2B5EF4-FFF2-40B4-BE49-F238E27FC236}">
-                  <a16:creationId xmlns:a16="http://schemas.microsoft.com/office/drawing/2014/main" xmlns="" id="{0119417F-7B8C-4457-B319-890D604EE57E}"/>
+                  <a16:creationId xmlns="" xmlns:a16="http://schemas.microsoft.com/office/drawing/2014/main" id="{0119417F-7B8C-4457-B319-890D604EE57E}"/>
                 </a:ext>
               </a:extLst>
             </p:cNvPr>
@@ -5730,7 +5736,7 @@
             <p:cNvPr id="15" name="Arrow: Down 14">
               <a:extLst>
                 <a:ext uri="{FF2B5EF4-FFF2-40B4-BE49-F238E27FC236}">
-                  <a16:creationId xmlns:a16="http://schemas.microsoft.com/office/drawing/2014/main" xmlns="" id="{BC337AC8-C6AB-459F-A43E-72D57EC55C57}"/>
+                  <a16:creationId xmlns="" xmlns:a16="http://schemas.microsoft.com/office/drawing/2014/main" id="{BC337AC8-C6AB-459F-A43E-72D57EC55C57}"/>
                 </a:ext>
               </a:extLst>
             </p:cNvPr>
@@ -5776,7 +5782,7 @@
             <p:cNvPr id="16" name="TextBox 15">
               <a:extLst>
                 <a:ext uri="{FF2B5EF4-FFF2-40B4-BE49-F238E27FC236}">
-                  <a16:creationId xmlns:a16="http://schemas.microsoft.com/office/drawing/2014/main" xmlns="" id="{7CC6FE22-9E6F-433A-83BF-C50D146F26C0}"/>
+                  <a16:creationId xmlns="" xmlns:a16="http://schemas.microsoft.com/office/drawing/2014/main" id="{7CC6FE22-9E6F-433A-83BF-C50D146F26C0}"/>
                 </a:ext>
               </a:extLst>
             </p:cNvPr>
@@ -5917,7 +5923,7 @@
           <p:cNvPr id="2" name="TextBox 1">
             <a:extLst>
               <a:ext uri="{FF2B5EF4-FFF2-40B4-BE49-F238E27FC236}">
-                <a16:creationId xmlns:a16="http://schemas.microsoft.com/office/drawing/2014/main" xmlns="" id="{29D59A62-E70A-49C9-8024-60EF785867C5}"/>
+                <a16:creationId xmlns="" xmlns:a16="http://schemas.microsoft.com/office/drawing/2014/main" id="{29D59A62-E70A-49C9-8024-60EF785867C5}"/>
               </a:ext>
             </a:extLst>
           </p:cNvPr>
@@ -5952,7 +5958,7 @@
           <p:cNvPr id="32" name="Group 31">
             <a:extLst>
               <a:ext uri="{FF2B5EF4-FFF2-40B4-BE49-F238E27FC236}">
-                <a16:creationId xmlns:a16="http://schemas.microsoft.com/office/drawing/2014/main" xmlns="" id="{6AF792DB-27EB-4946-B828-927148B49FD0}"/>
+                <a16:creationId xmlns="" xmlns:a16="http://schemas.microsoft.com/office/drawing/2014/main" id="{6AF792DB-27EB-4946-B828-927148B49FD0}"/>
               </a:ext>
             </a:extLst>
           </p:cNvPr>
@@ -5972,7 +5978,7 @@
             <p:cNvPr id="9" name="Rectangle: Rounded Corners 8">
               <a:extLst>
                 <a:ext uri="{FF2B5EF4-FFF2-40B4-BE49-F238E27FC236}">
-                  <a16:creationId xmlns:a16="http://schemas.microsoft.com/office/drawing/2014/main" xmlns="" id="{F52F6091-4484-4315-8271-D721DF502976}"/>
+                  <a16:creationId xmlns="" xmlns:a16="http://schemas.microsoft.com/office/drawing/2014/main" id="{F52F6091-4484-4315-8271-D721DF502976}"/>
                 </a:ext>
               </a:extLst>
             </p:cNvPr>
@@ -6021,7 +6027,7 @@
             <p:cNvPr id="10" name="Rectangle: Rounded Corners 9">
               <a:extLst>
                 <a:ext uri="{FF2B5EF4-FFF2-40B4-BE49-F238E27FC236}">
-                  <a16:creationId xmlns:a16="http://schemas.microsoft.com/office/drawing/2014/main" xmlns="" id="{2310663F-5B97-40FF-920E-495A0A70C9B0}"/>
+                  <a16:creationId xmlns="" xmlns:a16="http://schemas.microsoft.com/office/drawing/2014/main" id="{2310663F-5B97-40FF-920E-495A0A70C9B0}"/>
                 </a:ext>
               </a:extLst>
             </p:cNvPr>
@@ -6070,7 +6076,7 @@
             <p:cNvPr id="11" name="Rectangle: Rounded Corners 10">
               <a:extLst>
                 <a:ext uri="{FF2B5EF4-FFF2-40B4-BE49-F238E27FC236}">
-                  <a16:creationId xmlns:a16="http://schemas.microsoft.com/office/drawing/2014/main" xmlns="" id="{F6C94883-0A49-40E2-8854-58DFD485F1D1}"/>
+                  <a16:creationId xmlns="" xmlns:a16="http://schemas.microsoft.com/office/drawing/2014/main" id="{F6C94883-0A49-40E2-8854-58DFD485F1D1}"/>
                 </a:ext>
               </a:extLst>
             </p:cNvPr>
@@ -6119,7 +6125,7 @@
             <p:cNvPr id="12" name="Rectangle: Rounded Corners 11">
               <a:extLst>
                 <a:ext uri="{FF2B5EF4-FFF2-40B4-BE49-F238E27FC236}">
-                  <a16:creationId xmlns:a16="http://schemas.microsoft.com/office/drawing/2014/main" xmlns="" id="{B6519773-B1CF-4173-87A4-FFCD3C1ACF40}"/>
+                  <a16:creationId xmlns="" xmlns:a16="http://schemas.microsoft.com/office/drawing/2014/main" id="{B6519773-B1CF-4173-87A4-FFCD3C1ACF40}"/>
                 </a:ext>
               </a:extLst>
             </p:cNvPr>
@@ -6168,7 +6174,7 @@
             <p:cNvPr id="13" name="Rectangle: Rounded Corners 12">
               <a:extLst>
                 <a:ext uri="{FF2B5EF4-FFF2-40B4-BE49-F238E27FC236}">
-                  <a16:creationId xmlns:a16="http://schemas.microsoft.com/office/drawing/2014/main" xmlns="" id="{A96382AD-81C6-45AA-A98B-2EADBADC8038}"/>
+                  <a16:creationId xmlns="" xmlns:a16="http://schemas.microsoft.com/office/drawing/2014/main" id="{A96382AD-81C6-45AA-A98B-2EADBADC8038}"/>
                 </a:ext>
               </a:extLst>
             </p:cNvPr>
@@ -6217,7 +6223,7 @@
             <p:cNvPr id="14" name="Rectangle: Rounded Corners 13">
               <a:extLst>
                 <a:ext uri="{FF2B5EF4-FFF2-40B4-BE49-F238E27FC236}">
-                  <a16:creationId xmlns:a16="http://schemas.microsoft.com/office/drawing/2014/main" xmlns="" id="{012613B4-719D-4D3F-BDEF-E322707EAB6E}"/>
+                  <a16:creationId xmlns="" xmlns:a16="http://schemas.microsoft.com/office/drawing/2014/main" id="{012613B4-719D-4D3F-BDEF-E322707EAB6E}"/>
                 </a:ext>
               </a:extLst>
             </p:cNvPr>
@@ -6266,7 +6272,7 @@
             <p:cNvPr id="15" name="Rectangle: Rounded Corners 14">
               <a:extLst>
                 <a:ext uri="{FF2B5EF4-FFF2-40B4-BE49-F238E27FC236}">
-                  <a16:creationId xmlns:a16="http://schemas.microsoft.com/office/drawing/2014/main" xmlns="" id="{8356F25B-8AAD-43B4-B975-53C23791B5D7}"/>
+                  <a16:creationId xmlns="" xmlns:a16="http://schemas.microsoft.com/office/drawing/2014/main" id="{8356F25B-8AAD-43B4-B975-53C23791B5D7}"/>
                 </a:ext>
               </a:extLst>
             </p:cNvPr>
@@ -6315,7 +6321,7 @@
             <p:cNvPr id="16" name="Rectangle: Rounded Corners 15">
               <a:extLst>
                 <a:ext uri="{FF2B5EF4-FFF2-40B4-BE49-F238E27FC236}">
-                  <a16:creationId xmlns:a16="http://schemas.microsoft.com/office/drawing/2014/main" xmlns="" id="{4E99C617-9232-4DA2-B034-4A528711A525}"/>
+                  <a16:creationId xmlns="" xmlns:a16="http://schemas.microsoft.com/office/drawing/2014/main" id="{4E99C617-9232-4DA2-B034-4A528711A525}"/>
                 </a:ext>
               </a:extLst>
             </p:cNvPr>
@@ -6364,7 +6370,7 @@
             <p:cNvPr id="17" name="Rectangle: Rounded Corners 16">
               <a:extLst>
                 <a:ext uri="{FF2B5EF4-FFF2-40B4-BE49-F238E27FC236}">
-                  <a16:creationId xmlns:a16="http://schemas.microsoft.com/office/drawing/2014/main" xmlns="" id="{BCDE1A8E-590A-4425-9156-81F19717AC97}"/>
+                  <a16:creationId xmlns="" xmlns:a16="http://schemas.microsoft.com/office/drawing/2014/main" id="{BCDE1A8E-590A-4425-9156-81F19717AC97}"/>
                 </a:ext>
               </a:extLst>
             </p:cNvPr>
@@ -6413,7 +6419,7 @@
             <p:cNvPr id="18" name="Rectangle: Rounded Corners 17">
               <a:extLst>
                 <a:ext uri="{FF2B5EF4-FFF2-40B4-BE49-F238E27FC236}">
-                  <a16:creationId xmlns:a16="http://schemas.microsoft.com/office/drawing/2014/main" xmlns="" id="{926D988B-A87F-472F-A083-9EDC41AD2618}"/>
+                  <a16:creationId xmlns="" xmlns:a16="http://schemas.microsoft.com/office/drawing/2014/main" id="{926D988B-A87F-472F-A083-9EDC41AD2618}"/>
                 </a:ext>
               </a:extLst>
             </p:cNvPr>
@@ -6462,7 +6468,7 @@
             <p:cNvPr id="19" name="Rectangle: Rounded Corners 18">
               <a:extLst>
                 <a:ext uri="{FF2B5EF4-FFF2-40B4-BE49-F238E27FC236}">
-                  <a16:creationId xmlns:a16="http://schemas.microsoft.com/office/drawing/2014/main" xmlns="" id="{F67626E6-E695-4A99-BC0E-35D1AB104E50}"/>
+                  <a16:creationId xmlns="" xmlns:a16="http://schemas.microsoft.com/office/drawing/2014/main" id="{F67626E6-E695-4A99-BC0E-35D1AB104E50}"/>
                 </a:ext>
               </a:extLst>
             </p:cNvPr>
@@ -6511,7 +6517,7 @@
             <p:cNvPr id="20" name="Rectangle: Rounded Corners 19">
               <a:extLst>
                 <a:ext uri="{FF2B5EF4-FFF2-40B4-BE49-F238E27FC236}">
-                  <a16:creationId xmlns:a16="http://schemas.microsoft.com/office/drawing/2014/main" xmlns="" id="{0BC1A1BA-133D-4651-89DD-A802FE7AD3B4}"/>
+                  <a16:creationId xmlns="" xmlns:a16="http://schemas.microsoft.com/office/drawing/2014/main" id="{0BC1A1BA-133D-4651-89DD-A802FE7AD3B4}"/>
                 </a:ext>
               </a:extLst>
             </p:cNvPr>
@@ -6560,7 +6566,7 @@
             <p:cNvPr id="21" name="Rectangle: Rounded Corners 20">
               <a:extLst>
                 <a:ext uri="{FF2B5EF4-FFF2-40B4-BE49-F238E27FC236}">
-                  <a16:creationId xmlns:a16="http://schemas.microsoft.com/office/drawing/2014/main" xmlns="" id="{7B782F5A-F16F-49BE-BCF3-F27C57FA816E}"/>
+                  <a16:creationId xmlns="" xmlns:a16="http://schemas.microsoft.com/office/drawing/2014/main" id="{7B782F5A-F16F-49BE-BCF3-F27C57FA816E}"/>
                 </a:ext>
               </a:extLst>
             </p:cNvPr>
@@ -6609,7 +6615,7 @@
             <p:cNvPr id="22" name="Rectangle: Rounded Corners 21">
               <a:extLst>
                 <a:ext uri="{FF2B5EF4-FFF2-40B4-BE49-F238E27FC236}">
-                  <a16:creationId xmlns:a16="http://schemas.microsoft.com/office/drawing/2014/main" xmlns="" id="{C8606D9E-3608-46EE-BD13-8A9EFA39A8E1}"/>
+                  <a16:creationId xmlns="" xmlns:a16="http://schemas.microsoft.com/office/drawing/2014/main" id="{C8606D9E-3608-46EE-BD13-8A9EFA39A8E1}"/>
                 </a:ext>
               </a:extLst>
             </p:cNvPr>
@@ -6661,7 +6667,7 @@
             <p:cNvPr id="23" name="Rectangle: Rounded Corners 22">
               <a:extLst>
                 <a:ext uri="{FF2B5EF4-FFF2-40B4-BE49-F238E27FC236}">
-                  <a16:creationId xmlns:a16="http://schemas.microsoft.com/office/drawing/2014/main" xmlns="" id="{E1196CC7-6DDA-404B-AF85-E65601277E39}"/>
+                  <a16:creationId xmlns="" xmlns:a16="http://schemas.microsoft.com/office/drawing/2014/main" id="{E1196CC7-6DDA-404B-AF85-E65601277E39}"/>
                 </a:ext>
               </a:extLst>
             </p:cNvPr>
@@ -6710,7 +6716,7 @@
             <p:cNvPr id="24" name="Rectangle: Rounded Corners 23">
               <a:extLst>
                 <a:ext uri="{FF2B5EF4-FFF2-40B4-BE49-F238E27FC236}">
-                  <a16:creationId xmlns:a16="http://schemas.microsoft.com/office/drawing/2014/main" xmlns="" id="{7FD89A78-7417-4FDF-912E-8B8C94A48710}"/>
+                  <a16:creationId xmlns="" xmlns:a16="http://schemas.microsoft.com/office/drawing/2014/main" id="{7FD89A78-7417-4FDF-912E-8B8C94A48710}"/>
                 </a:ext>
               </a:extLst>
             </p:cNvPr>
@@ -6759,7 +6765,7 @@
             <p:cNvPr id="27" name="TextBox 26">
               <a:extLst>
                 <a:ext uri="{FF2B5EF4-FFF2-40B4-BE49-F238E27FC236}">
-                  <a16:creationId xmlns:a16="http://schemas.microsoft.com/office/drawing/2014/main" xmlns="" id="{E4F407CD-2FFC-4252-A8CA-D6A66AFF85C8}"/>
+                  <a16:creationId xmlns="" xmlns:a16="http://schemas.microsoft.com/office/drawing/2014/main" id="{E4F407CD-2FFC-4252-A8CA-D6A66AFF85C8}"/>
                 </a:ext>
               </a:extLst>
             </p:cNvPr>
@@ -6818,7 +6824,7 @@
             <p:cNvPr id="28" name="TextBox 27">
               <a:extLst>
                 <a:ext uri="{FF2B5EF4-FFF2-40B4-BE49-F238E27FC236}">
-                  <a16:creationId xmlns:a16="http://schemas.microsoft.com/office/drawing/2014/main" xmlns="" id="{EB2DBE27-2CEF-41E4-AFA4-D2166DC3D968}"/>
+                  <a16:creationId xmlns="" xmlns:a16="http://schemas.microsoft.com/office/drawing/2014/main" id="{EB2DBE27-2CEF-41E4-AFA4-D2166DC3D968}"/>
                 </a:ext>
               </a:extLst>
             </p:cNvPr>
@@ -6877,7 +6883,7 @@
             <p:cNvPr id="29" name="TextBox 28">
               <a:extLst>
                 <a:ext uri="{FF2B5EF4-FFF2-40B4-BE49-F238E27FC236}">
-                  <a16:creationId xmlns:a16="http://schemas.microsoft.com/office/drawing/2014/main" xmlns="" id="{62513543-586A-4205-BD35-217991FCA942}"/>
+                  <a16:creationId xmlns="" xmlns:a16="http://schemas.microsoft.com/office/drawing/2014/main" id="{62513543-586A-4205-BD35-217991FCA942}"/>
                 </a:ext>
               </a:extLst>
             </p:cNvPr>
@@ -6936,7 +6942,7 @@
             <p:cNvPr id="31" name="TextBox 30">
               <a:extLst>
                 <a:ext uri="{FF2B5EF4-FFF2-40B4-BE49-F238E27FC236}">
-                  <a16:creationId xmlns:a16="http://schemas.microsoft.com/office/drawing/2014/main" xmlns="" id="{4685DCCA-212F-42B9-A547-BADB68EC13F9}"/>
+                  <a16:creationId xmlns="" xmlns:a16="http://schemas.microsoft.com/office/drawing/2014/main" id="{4685DCCA-212F-42B9-A547-BADB68EC13F9}"/>
                 </a:ext>
               </a:extLst>
             </p:cNvPr>
@@ -7026,7 +7032,7 @@
           <p:cNvPr id="2" name="TextBox 1">
             <a:extLst>
               <a:ext uri="{FF2B5EF4-FFF2-40B4-BE49-F238E27FC236}">
-                <a16:creationId xmlns:a16="http://schemas.microsoft.com/office/drawing/2014/main" xmlns="" id="{29D59A62-E70A-49C9-8024-60EF785867C5}"/>
+                <a16:creationId xmlns="" xmlns:a16="http://schemas.microsoft.com/office/drawing/2014/main" id="{29D59A62-E70A-49C9-8024-60EF785867C5}"/>
               </a:ext>
             </a:extLst>
           </p:cNvPr>
@@ -7061,7 +7067,7 @@
           <p:cNvPr id="4" name="Group 3">
             <a:extLst>
               <a:ext uri="{FF2B5EF4-FFF2-40B4-BE49-F238E27FC236}">
-                <a16:creationId xmlns:a16="http://schemas.microsoft.com/office/drawing/2014/main" xmlns="" id="{B0F207C1-ADED-422B-8AD3-B6E8F0965A94}"/>
+                <a16:creationId xmlns="" xmlns:a16="http://schemas.microsoft.com/office/drawing/2014/main" id="{B0F207C1-ADED-422B-8AD3-B6E8F0965A94}"/>
               </a:ext>
             </a:extLst>
           </p:cNvPr>
@@ -7081,7 +7087,7 @@
             <p:cNvPr id="9" name="Rectangle: Rounded Corners 8">
               <a:extLst>
                 <a:ext uri="{FF2B5EF4-FFF2-40B4-BE49-F238E27FC236}">
-                  <a16:creationId xmlns:a16="http://schemas.microsoft.com/office/drawing/2014/main" xmlns="" id="{F52F6091-4484-4315-8271-D721DF502976}"/>
+                  <a16:creationId xmlns="" xmlns:a16="http://schemas.microsoft.com/office/drawing/2014/main" id="{F52F6091-4484-4315-8271-D721DF502976}"/>
                 </a:ext>
               </a:extLst>
             </p:cNvPr>
@@ -7138,7 +7144,7 @@
             <p:cNvPr id="10" name="Rectangle: Rounded Corners 9">
               <a:extLst>
                 <a:ext uri="{FF2B5EF4-FFF2-40B4-BE49-F238E27FC236}">
-                  <a16:creationId xmlns:a16="http://schemas.microsoft.com/office/drawing/2014/main" xmlns="" id="{2310663F-5B97-40FF-920E-495A0A70C9B0}"/>
+                  <a16:creationId xmlns="" xmlns:a16="http://schemas.microsoft.com/office/drawing/2014/main" id="{2310663F-5B97-40FF-920E-495A0A70C9B0}"/>
                 </a:ext>
               </a:extLst>
             </p:cNvPr>
@@ -7187,7 +7193,7 @@
             <p:cNvPr id="11" name="Rectangle: Rounded Corners 10">
               <a:extLst>
                 <a:ext uri="{FF2B5EF4-FFF2-40B4-BE49-F238E27FC236}">
-                  <a16:creationId xmlns:a16="http://schemas.microsoft.com/office/drawing/2014/main" xmlns="" id="{F6C94883-0A49-40E2-8854-58DFD485F1D1}"/>
+                  <a16:creationId xmlns="" xmlns:a16="http://schemas.microsoft.com/office/drawing/2014/main" id="{F6C94883-0A49-40E2-8854-58DFD485F1D1}"/>
                 </a:ext>
               </a:extLst>
             </p:cNvPr>
@@ -7236,7 +7242,7 @@
             <p:cNvPr id="12" name="Rectangle: Rounded Corners 11">
               <a:extLst>
                 <a:ext uri="{FF2B5EF4-FFF2-40B4-BE49-F238E27FC236}">
-                  <a16:creationId xmlns:a16="http://schemas.microsoft.com/office/drawing/2014/main" xmlns="" id="{B6519773-B1CF-4173-87A4-FFCD3C1ACF40}"/>
+                  <a16:creationId xmlns="" xmlns:a16="http://schemas.microsoft.com/office/drawing/2014/main" id="{B6519773-B1CF-4173-87A4-FFCD3C1ACF40}"/>
                 </a:ext>
               </a:extLst>
             </p:cNvPr>
@@ -7293,7 +7299,7 @@
             <p:cNvPr id="13" name="Rectangle: Rounded Corners 12">
               <a:extLst>
                 <a:ext uri="{FF2B5EF4-FFF2-40B4-BE49-F238E27FC236}">
-                  <a16:creationId xmlns:a16="http://schemas.microsoft.com/office/drawing/2014/main" xmlns="" id="{A96382AD-81C6-45AA-A98B-2EADBADC8038}"/>
+                  <a16:creationId xmlns="" xmlns:a16="http://schemas.microsoft.com/office/drawing/2014/main" id="{A96382AD-81C6-45AA-A98B-2EADBADC8038}"/>
                 </a:ext>
               </a:extLst>
             </p:cNvPr>
@@ -7342,7 +7348,7 @@
             <p:cNvPr id="14" name="Rectangle: Rounded Corners 13">
               <a:extLst>
                 <a:ext uri="{FF2B5EF4-FFF2-40B4-BE49-F238E27FC236}">
-                  <a16:creationId xmlns:a16="http://schemas.microsoft.com/office/drawing/2014/main" xmlns="" id="{012613B4-719D-4D3F-BDEF-E322707EAB6E}"/>
+                  <a16:creationId xmlns="" xmlns:a16="http://schemas.microsoft.com/office/drawing/2014/main" id="{012613B4-719D-4D3F-BDEF-E322707EAB6E}"/>
                 </a:ext>
               </a:extLst>
             </p:cNvPr>
@@ -7391,7 +7397,7 @@
             <p:cNvPr id="15" name="Rectangle: Rounded Corners 14">
               <a:extLst>
                 <a:ext uri="{FF2B5EF4-FFF2-40B4-BE49-F238E27FC236}">
-                  <a16:creationId xmlns:a16="http://schemas.microsoft.com/office/drawing/2014/main" xmlns="" id="{8356F25B-8AAD-43B4-B975-53C23791B5D7}"/>
+                  <a16:creationId xmlns="" xmlns:a16="http://schemas.microsoft.com/office/drawing/2014/main" id="{8356F25B-8AAD-43B4-B975-53C23791B5D7}"/>
                 </a:ext>
               </a:extLst>
             </p:cNvPr>
@@ -7440,7 +7446,7 @@
             <p:cNvPr id="16" name="Rectangle: Rounded Corners 15">
               <a:extLst>
                 <a:ext uri="{FF2B5EF4-FFF2-40B4-BE49-F238E27FC236}">
-                  <a16:creationId xmlns:a16="http://schemas.microsoft.com/office/drawing/2014/main" xmlns="" id="{4E99C617-9232-4DA2-B034-4A528711A525}"/>
+                  <a16:creationId xmlns="" xmlns:a16="http://schemas.microsoft.com/office/drawing/2014/main" id="{4E99C617-9232-4DA2-B034-4A528711A525}"/>
                 </a:ext>
               </a:extLst>
             </p:cNvPr>
@@ -7497,7 +7503,7 @@
             <p:cNvPr id="17" name="Rectangle: Rounded Corners 16">
               <a:extLst>
                 <a:ext uri="{FF2B5EF4-FFF2-40B4-BE49-F238E27FC236}">
-                  <a16:creationId xmlns:a16="http://schemas.microsoft.com/office/drawing/2014/main" xmlns="" id="{BCDE1A8E-590A-4425-9156-81F19717AC97}"/>
+                  <a16:creationId xmlns="" xmlns:a16="http://schemas.microsoft.com/office/drawing/2014/main" id="{BCDE1A8E-590A-4425-9156-81F19717AC97}"/>
                 </a:ext>
               </a:extLst>
             </p:cNvPr>
@@ -7551,7 +7557,7 @@
             <p:cNvPr id="18" name="Rectangle: Rounded Corners 17">
               <a:extLst>
                 <a:ext uri="{FF2B5EF4-FFF2-40B4-BE49-F238E27FC236}">
-                  <a16:creationId xmlns:a16="http://schemas.microsoft.com/office/drawing/2014/main" xmlns="" id="{926D988B-A87F-472F-A083-9EDC41AD2618}"/>
+                  <a16:creationId xmlns="" xmlns:a16="http://schemas.microsoft.com/office/drawing/2014/main" id="{926D988B-A87F-472F-A083-9EDC41AD2618}"/>
                 </a:ext>
               </a:extLst>
             </p:cNvPr>
@@ -7600,7 +7606,7 @@
             <p:cNvPr id="19" name="Rectangle: Rounded Corners 18">
               <a:extLst>
                 <a:ext uri="{FF2B5EF4-FFF2-40B4-BE49-F238E27FC236}">
-                  <a16:creationId xmlns:a16="http://schemas.microsoft.com/office/drawing/2014/main" xmlns="" id="{F67626E6-E695-4A99-BC0E-35D1AB104E50}"/>
+                  <a16:creationId xmlns="" xmlns:a16="http://schemas.microsoft.com/office/drawing/2014/main" id="{F67626E6-E695-4A99-BC0E-35D1AB104E50}"/>
                 </a:ext>
               </a:extLst>
             </p:cNvPr>
@@ -7649,7 +7655,7 @@
             <p:cNvPr id="20" name="Rectangle: Rounded Corners 19">
               <a:extLst>
                 <a:ext uri="{FF2B5EF4-FFF2-40B4-BE49-F238E27FC236}">
-                  <a16:creationId xmlns:a16="http://schemas.microsoft.com/office/drawing/2014/main" xmlns="" id="{0BC1A1BA-133D-4651-89DD-A802FE7AD3B4}"/>
+                  <a16:creationId xmlns="" xmlns:a16="http://schemas.microsoft.com/office/drawing/2014/main" id="{0BC1A1BA-133D-4651-89DD-A802FE7AD3B4}"/>
                 </a:ext>
               </a:extLst>
             </p:cNvPr>
@@ -7703,7 +7709,7 @@
             <p:cNvPr id="21" name="Rectangle: Rounded Corners 20">
               <a:extLst>
                 <a:ext uri="{FF2B5EF4-FFF2-40B4-BE49-F238E27FC236}">
-                  <a16:creationId xmlns:a16="http://schemas.microsoft.com/office/drawing/2014/main" xmlns="" id="{7B782F5A-F16F-49BE-BCF3-F27C57FA816E}"/>
+                  <a16:creationId xmlns="" xmlns:a16="http://schemas.microsoft.com/office/drawing/2014/main" id="{7B782F5A-F16F-49BE-BCF3-F27C57FA816E}"/>
                 </a:ext>
               </a:extLst>
             </p:cNvPr>
@@ -7752,7 +7758,7 @@
             <p:cNvPr id="22" name="Rectangle: Rounded Corners 21">
               <a:extLst>
                 <a:ext uri="{FF2B5EF4-FFF2-40B4-BE49-F238E27FC236}">
-                  <a16:creationId xmlns:a16="http://schemas.microsoft.com/office/drawing/2014/main" xmlns="" id="{C8606D9E-3608-46EE-BD13-8A9EFA39A8E1}"/>
+                  <a16:creationId xmlns="" xmlns:a16="http://schemas.microsoft.com/office/drawing/2014/main" id="{C8606D9E-3608-46EE-BD13-8A9EFA39A8E1}"/>
                 </a:ext>
               </a:extLst>
             </p:cNvPr>
@@ -7804,7 +7810,7 @@
             <p:cNvPr id="23" name="Rectangle: Rounded Corners 22">
               <a:extLst>
                 <a:ext uri="{FF2B5EF4-FFF2-40B4-BE49-F238E27FC236}">
-                  <a16:creationId xmlns:a16="http://schemas.microsoft.com/office/drawing/2014/main" xmlns="" id="{E1196CC7-6DDA-404B-AF85-E65601277E39}"/>
+                  <a16:creationId xmlns="" xmlns:a16="http://schemas.microsoft.com/office/drawing/2014/main" id="{E1196CC7-6DDA-404B-AF85-E65601277E39}"/>
                 </a:ext>
               </a:extLst>
             </p:cNvPr>
@@ -7853,7 +7859,7 @@
             <p:cNvPr id="24" name="Rectangle: Rounded Corners 23">
               <a:extLst>
                 <a:ext uri="{FF2B5EF4-FFF2-40B4-BE49-F238E27FC236}">
-                  <a16:creationId xmlns:a16="http://schemas.microsoft.com/office/drawing/2014/main" xmlns="" id="{7FD89A78-7417-4FDF-912E-8B8C94A48710}"/>
+                  <a16:creationId xmlns="" xmlns:a16="http://schemas.microsoft.com/office/drawing/2014/main" id="{7FD89A78-7417-4FDF-912E-8B8C94A48710}"/>
                 </a:ext>
               </a:extLst>
             </p:cNvPr>
@@ -7907,7 +7913,7 @@
             <p:cNvPr id="27" name="TextBox 26">
               <a:extLst>
                 <a:ext uri="{FF2B5EF4-FFF2-40B4-BE49-F238E27FC236}">
-                  <a16:creationId xmlns:a16="http://schemas.microsoft.com/office/drawing/2014/main" xmlns="" id="{E4F407CD-2FFC-4252-A8CA-D6A66AFF85C8}"/>
+                  <a16:creationId xmlns="" xmlns:a16="http://schemas.microsoft.com/office/drawing/2014/main" id="{E4F407CD-2FFC-4252-A8CA-D6A66AFF85C8}"/>
                 </a:ext>
               </a:extLst>
             </p:cNvPr>
@@ -7966,7 +7972,7 @@
             <p:cNvPr id="28" name="TextBox 27">
               <a:extLst>
                 <a:ext uri="{FF2B5EF4-FFF2-40B4-BE49-F238E27FC236}">
-                  <a16:creationId xmlns:a16="http://schemas.microsoft.com/office/drawing/2014/main" xmlns="" id="{EB2DBE27-2CEF-41E4-AFA4-D2166DC3D968}"/>
+                  <a16:creationId xmlns="" xmlns:a16="http://schemas.microsoft.com/office/drawing/2014/main" id="{EB2DBE27-2CEF-41E4-AFA4-D2166DC3D968}"/>
                 </a:ext>
               </a:extLst>
             </p:cNvPr>
@@ -8025,7 +8031,7 @@
             <p:cNvPr id="29" name="TextBox 28">
               <a:extLst>
                 <a:ext uri="{FF2B5EF4-FFF2-40B4-BE49-F238E27FC236}">
-                  <a16:creationId xmlns:a16="http://schemas.microsoft.com/office/drawing/2014/main" xmlns="" id="{62513543-586A-4205-BD35-217991FCA942}"/>
+                  <a16:creationId xmlns="" xmlns:a16="http://schemas.microsoft.com/office/drawing/2014/main" id="{62513543-586A-4205-BD35-217991FCA942}"/>
                 </a:ext>
               </a:extLst>
             </p:cNvPr>
@@ -8084,7 +8090,7 @@
             <p:cNvPr id="35" name="TextBox 34">
               <a:extLst>
                 <a:ext uri="{FF2B5EF4-FFF2-40B4-BE49-F238E27FC236}">
-                  <a16:creationId xmlns:a16="http://schemas.microsoft.com/office/drawing/2014/main" xmlns="" id="{81C18030-13F8-40B6-AC34-A6F076ED57BF}"/>
+                  <a16:creationId xmlns="" xmlns:a16="http://schemas.microsoft.com/office/drawing/2014/main" id="{81C18030-13F8-40B6-AC34-A6F076ED57BF}"/>
                 </a:ext>
               </a:extLst>
             </p:cNvPr>
@@ -8174,7 +8180,7 @@
           <p:cNvPr id="2" name="TextBox 1">
             <a:extLst>
               <a:ext uri="{FF2B5EF4-FFF2-40B4-BE49-F238E27FC236}">
-                <a16:creationId xmlns:a16="http://schemas.microsoft.com/office/drawing/2014/main" xmlns="" id="{E52715F9-5F16-40CE-A04B-CF83EA31FBBF}"/>
+                <a16:creationId xmlns="" xmlns:a16="http://schemas.microsoft.com/office/drawing/2014/main" id="{E52715F9-5F16-40CE-A04B-CF83EA31FBBF}"/>
               </a:ext>
             </a:extLst>
           </p:cNvPr>
@@ -8184,7 +8190,7 @@
         <p:spPr>
           <a:xfrm>
             <a:off x="622571" y="291830"/>
-            <a:ext cx="3175228" cy="584775"/>
+            <a:ext cx="3627275" cy="584775"/>
           </a:xfrm>
           <a:prstGeom prst="rect">
             <a:avLst/>
@@ -8198,8 +8204,16 @@
           <a:lstStyle/>
           <a:p>
             <a:r>
+              <a:rPr lang="en-US" sz="3200" b="1" dirty="0">
+                <a:solidFill>
+                  <a:srgbClr val="FF0000"/>
+                </a:solidFill>
+              </a:rPr>
+              <a:t>M</a:t>
+            </a:r>
+            <a:r>
               <a:rPr lang="en-US" sz="3200" b="1" dirty="0" smtClean="0"/>
-              <a:t>SMART </a:t>
+              <a:t> SMART </a:t>
             </a:r>
             <a:r>
               <a:rPr lang="en-US" sz="3200" b="1" dirty="0"/>
@@ -8213,7 +8227,7 @@
           <p:cNvPr id="4" name="TextBox 3">
             <a:extLst>
               <a:ext uri="{FF2B5EF4-FFF2-40B4-BE49-F238E27FC236}">
-                <a16:creationId xmlns:a16="http://schemas.microsoft.com/office/drawing/2014/main" xmlns="" id="{B202A72A-202B-415D-B39F-6FE5382C4849}"/>
+                <a16:creationId xmlns="" xmlns:a16="http://schemas.microsoft.com/office/drawing/2014/main" id="{B202A72A-202B-415D-B39F-6FE5382C4849}"/>
               </a:ext>
             </a:extLst>
           </p:cNvPr>
@@ -8299,7 +8313,7 @@
           <p:cNvPr id="2" name="TextBox 1">
             <a:extLst>
               <a:ext uri="{FF2B5EF4-FFF2-40B4-BE49-F238E27FC236}">
-                <a16:creationId xmlns:a16="http://schemas.microsoft.com/office/drawing/2014/main" xmlns="" id="{0B2F962F-478E-41EE-8A61-25FFDB01A5BB}"/>
+                <a16:creationId xmlns="" xmlns:a16="http://schemas.microsoft.com/office/drawing/2014/main" id="{0B2F962F-478E-41EE-8A61-25FFDB01A5BB}"/>
               </a:ext>
             </a:extLst>
           </p:cNvPr>
@@ -8334,7 +8348,7 @@
           <p:cNvPr id="3" name="Picture 2">
             <a:extLst>
               <a:ext uri="{FF2B5EF4-FFF2-40B4-BE49-F238E27FC236}">
-                <a16:creationId xmlns:a16="http://schemas.microsoft.com/office/drawing/2014/main" xmlns="" id="{1F3D482E-9F08-4286-BADC-6102EDFBCFEF}"/>
+                <a16:creationId xmlns="" xmlns:a16="http://schemas.microsoft.com/office/drawing/2014/main" id="{1F3D482E-9F08-4286-BADC-6102EDFBCFEF}"/>
               </a:ext>
             </a:extLst>
           </p:cNvPr>
@@ -8364,7 +8378,7 @@
           <p:cNvPr id="4" name="Rectangle: Rounded Corners 3">
             <a:extLst>
               <a:ext uri="{FF2B5EF4-FFF2-40B4-BE49-F238E27FC236}">
-                <a16:creationId xmlns:a16="http://schemas.microsoft.com/office/drawing/2014/main" xmlns="" id="{6E5D743D-4B8E-4A64-8FF9-0309B5CBF38E}"/>
+                <a16:creationId xmlns="" xmlns:a16="http://schemas.microsoft.com/office/drawing/2014/main" id="{6E5D743D-4B8E-4A64-8FF9-0309B5CBF38E}"/>
               </a:ext>
             </a:extLst>
           </p:cNvPr>
@@ -8413,7 +8427,7 @@
           <p:cNvPr id="5" name="Rectangle: Rounded Corners 4">
             <a:extLst>
               <a:ext uri="{FF2B5EF4-FFF2-40B4-BE49-F238E27FC236}">
-                <a16:creationId xmlns:a16="http://schemas.microsoft.com/office/drawing/2014/main" xmlns="" id="{B2563DD1-0E21-4485-BF64-BEE30290C5BB}"/>
+                <a16:creationId xmlns="" xmlns:a16="http://schemas.microsoft.com/office/drawing/2014/main" id="{B2563DD1-0E21-4485-BF64-BEE30290C5BB}"/>
               </a:ext>
             </a:extLst>
           </p:cNvPr>
@@ -8462,7 +8476,7 @@
           <p:cNvPr id="6" name="Rectangle: Rounded Corners 5">
             <a:extLst>
               <a:ext uri="{FF2B5EF4-FFF2-40B4-BE49-F238E27FC236}">
-                <a16:creationId xmlns:a16="http://schemas.microsoft.com/office/drawing/2014/main" xmlns="" id="{96EC9A64-4F95-4F7B-8C2D-15597EBF4B68}"/>
+                <a16:creationId xmlns="" xmlns:a16="http://schemas.microsoft.com/office/drawing/2014/main" id="{96EC9A64-4F95-4F7B-8C2D-15597EBF4B68}"/>
               </a:ext>
             </a:extLst>
           </p:cNvPr>
@@ -8511,7 +8525,7 @@
           <p:cNvPr id="7" name="Arrow: Left 6">
             <a:extLst>
               <a:ext uri="{FF2B5EF4-FFF2-40B4-BE49-F238E27FC236}">
-                <a16:creationId xmlns:a16="http://schemas.microsoft.com/office/drawing/2014/main" xmlns="" id="{E436EB20-076C-4527-ACE7-693F2E5C2E40}"/>
+                <a16:creationId xmlns="" xmlns:a16="http://schemas.microsoft.com/office/drawing/2014/main" id="{E436EB20-076C-4527-ACE7-693F2E5C2E40}"/>
               </a:ext>
             </a:extLst>
           </p:cNvPr>
@@ -8557,7 +8571,7 @@
           <p:cNvPr id="8" name="Arrow: Left 7">
             <a:extLst>
               <a:ext uri="{FF2B5EF4-FFF2-40B4-BE49-F238E27FC236}">
-                <a16:creationId xmlns:a16="http://schemas.microsoft.com/office/drawing/2014/main" xmlns="" id="{6428C742-0FF1-4C6F-A486-8EFCE628A655}"/>
+                <a16:creationId xmlns="" xmlns:a16="http://schemas.microsoft.com/office/drawing/2014/main" id="{6428C742-0FF1-4C6F-A486-8EFCE628A655}"/>
               </a:ext>
             </a:extLst>
           </p:cNvPr>
@@ -8603,7 +8617,7 @@
           <p:cNvPr id="9" name="Rectangle: Rounded Corners 8">
             <a:extLst>
               <a:ext uri="{FF2B5EF4-FFF2-40B4-BE49-F238E27FC236}">
-                <a16:creationId xmlns:a16="http://schemas.microsoft.com/office/drawing/2014/main" xmlns="" id="{A1BF728C-5458-4EC1-82A3-67D6C6AE75C4}"/>
+                <a16:creationId xmlns="" xmlns:a16="http://schemas.microsoft.com/office/drawing/2014/main" id="{A1BF728C-5458-4EC1-82A3-67D6C6AE75C4}"/>
               </a:ext>
             </a:extLst>
           </p:cNvPr>
@@ -8652,7 +8666,7 @@
           <p:cNvPr id="10" name="Rectangle: Rounded Corners 9">
             <a:extLst>
               <a:ext uri="{FF2B5EF4-FFF2-40B4-BE49-F238E27FC236}">
-                <a16:creationId xmlns:a16="http://schemas.microsoft.com/office/drawing/2014/main" xmlns="" id="{9CC69B22-A411-48CF-B4F2-45D0C72CC745}"/>
+                <a16:creationId xmlns="" xmlns:a16="http://schemas.microsoft.com/office/drawing/2014/main" id="{9CC69B22-A411-48CF-B4F2-45D0C72CC745}"/>
               </a:ext>
             </a:extLst>
           </p:cNvPr>
@@ -8732,7 +8746,7 @@
           <p:cNvPr id="2" name="TextBox 1">
             <a:extLst>
               <a:ext uri="{FF2B5EF4-FFF2-40B4-BE49-F238E27FC236}">
-                <a16:creationId xmlns:a16="http://schemas.microsoft.com/office/drawing/2014/main" xmlns="" id="{C8FA0A63-E669-400A-B853-1301ADFAA5C8}"/>
+                <a16:creationId xmlns="" xmlns:a16="http://schemas.microsoft.com/office/drawing/2014/main" id="{C8FA0A63-E669-400A-B853-1301ADFAA5C8}"/>
               </a:ext>
             </a:extLst>
           </p:cNvPr>
@@ -8767,7 +8781,7 @@
           <p:cNvPr id="22" name="Group 21">
             <a:extLst>
               <a:ext uri="{FF2B5EF4-FFF2-40B4-BE49-F238E27FC236}">
-                <a16:creationId xmlns:a16="http://schemas.microsoft.com/office/drawing/2014/main" xmlns="" id="{DA30DEB6-6110-49A3-8FBA-099EE2B30A27}"/>
+                <a16:creationId xmlns="" xmlns:a16="http://schemas.microsoft.com/office/drawing/2014/main" id="{DA30DEB6-6110-49A3-8FBA-099EE2B30A27}"/>
               </a:ext>
             </a:extLst>
           </p:cNvPr>
@@ -8787,7 +8801,7 @@
             <p:cNvPr id="14" name="Group 13">
               <a:extLst>
                 <a:ext uri="{FF2B5EF4-FFF2-40B4-BE49-F238E27FC236}">
-                  <a16:creationId xmlns:a16="http://schemas.microsoft.com/office/drawing/2014/main" xmlns="" id="{AC77212E-7D1C-4E02-9FD0-F75835E8D8F2}"/>
+                  <a16:creationId xmlns="" xmlns:a16="http://schemas.microsoft.com/office/drawing/2014/main" id="{AC77212E-7D1C-4E02-9FD0-F75835E8D8F2}"/>
                 </a:ext>
               </a:extLst>
             </p:cNvPr>
@@ -8807,7 +8821,7 @@
               <p:cNvPr id="3" name="Picture 2">
                 <a:extLst>
                   <a:ext uri="{FF2B5EF4-FFF2-40B4-BE49-F238E27FC236}">
-                    <a16:creationId xmlns:a16="http://schemas.microsoft.com/office/drawing/2014/main" xmlns="" id="{D5876341-5DEC-4DD4-B40B-F53F7A582269}"/>
+                    <a16:creationId xmlns="" xmlns:a16="http://schemas.microsoft.com/office/drawing/2014/main" id="{D5876341-5DEC-4DD4-B40B-F53F7A582269}"/>
                   </a:ext>
                 </a:extLst>
               </p:cNvPr>
@@ -8837,7 +8851,7 @@
               <p:cNvPr id="7" name="Group 6">
                 <a:extLst>
                   <a:ext uri="{FF2B5EF4-FFF2-40B4-BE49-F238E27FC236}">
-                    <a16:creationId xmlns:a16="http://schemas.microsoft.com/office/drawing/2014/main" xmlns="" id="{AB5BBB8F-3AAB-4509-8223-ABD5BC5991F9}"/>
+                    <a16:creationId xmlns="" xmlns:a16="http://schemas.microsoft.com/office/drawing/2014/main" id="{AB5BBB8F-3AAB-4509-8223-ABD5BC5991F9}"/>
                   </a:ext>
                 </a:extLst>
               </p:cNvPr>
@@ -8857,7 +8871,7 @@
                 <p:cNvPr id="4" name="TextBox 3">
                   <a:extLst>
                     <a:ext uri="{FF2B5EF4-FFF2-40B4-BE49-F238E27FC236}">
-                      <a16:creationId xmlns:a16="http://schemas.microsoft.com/office/drawing/2014/main" xmlns="" id="{DCD921CD-DC7B-41E6-A5FB-187A65CF3EE3}"/>
+                      <a16:creationId xmlns="" xmlns:a16="http://schemas.microsoft.com/office/drawing/2014/main" id="{DCD921CD-DC7B-41E6-A5FB-187A65CF3EE3}"/>
                     </a:ext>
                   </a:extLst>
                 </p:cNvPr>
@@ -8893,7 +8907,7 @@
                 <p:cNvPr id="6" name="Straight Arrow Connector 5">
                   <a:extLst>
                     <a:ext uri="{FF2B5EF4-FFF2-40B4-BE49-F238E27FC236}">
-                      <a16:creationId xmlns:a16="http://schemas.microsoft.com/office/drawing/2014/main" xmlns="" id="{C8E52E64-7FE9-4B78-9F68-93C6BC9C8678}"/>
+                      <a16:creationId xmlns="" xmlns:a16="http://schemas.microsoft.com/office/drawing/2014/main" id="{C8E52E64-7FE9-4B78-9F68-93C6BC9C8678}"/>
                     </a:ext>
                   </a:extLst>
                 </p:cNvPr>
@@ -8935,7 +8949,7 @@
               <p:cNvPr id="8" name="TextBox 7">
                 <a:extLst>
                   <a:ext uri="{FF2B5EF4-FFF2-40B4-BE49-F238E27FC236}">
-                    <a16:creationId xmlns:a16="http://schemas.microsoft.com/office/drawing/2014/main" xmlns="" id="{FEDFDE0F-F925-4205-B331-5C7D3F310F4B}"/>
+                    <a16:creationId xmlns="" xmlns:a16="http://schemas.microsoft.com/office/drawing/2014/main" id="{FEDFDE0F-F925-4205-B331-5C7D3F310F4B}"/>
                   </a:ext>
                 </a:extLst>
               </p:cNvPr>
@@ -8971,7 +8985,7 @@
               <p:cNvPr id="9" name="TextBox 8">
                 <a:extLst>
                   <a:ext uri="{FF2B5EF4-FFF2-40B4-BE49-F238E27FC236}">
-                    <a16:creationId xmlns:a16="http://schemas.microsoft.com/office/drawing/2014/main" xmlns="" id="{67A32881-F932-44B9-A800-AF1E18BDC09F}"/>
+                    <a16:creationId xmlns="" xmlns:a16="http://schemas.microsoft.com/office/drawing/2014/main" id="{67A32881-F932-44B9-A800-AF1E18BDC09F}"/>
                   </a:ext>
                 </a:extLst>
               </p:cNvPr>
@@ -9007,7 +9021,7 @@
               <p:cNvPr id="10" name="TextBox 9">
                 <a:extLst>
                   <a:ext uri="{FF2B5EF4-FFF2-40B4-BE49-F238E27FC236}">
-                    <a16:creationId xmlns:a16="http://schemas.microsoft.com/office/drawing/2014/main" xmlns="" id="{48986CCF-5FDC-47CB-BD99-C82E33EC3378}"/>
+                    <a16:creationId xmlns="" xmlns:a16="http://schemas.microsoft.com/office/drawing/2014/main" id="{48986CCF-5FDC-47CB-BD99-C82E33EC3378}"/>
                   </a:ext>
                 </a:extLst>
               </p:cNvPr>
@@ -9043,7 +9057,7 @@
               <p:cNvPr id="11" name="TextBox 10">
                 <a:extLst>
                   <a:ext uri="{FF2B5EF4-FFF2-40B4-BE49-F238E27FC236}">
-                    <a16:creationId xmlns:a16="http://schemas.microsoft.com/office/drawing/2014/main" xmlns="" id="{39845953-148F-4E0F-9039-AB390F022FF7}"/>
+                    <a16:creationId xmlns="" xmlns:a16="http://schemas.microsoft.com/office/drawing/2014/main" id="{39845953-148F-4E0F-9039-AB390F022FF7}"/>
                   </a:ext>
                 </a:extLst>
               </p:cNvPr>
@@ -9079,7 +9093,7 @@
               <p:cNvPr id="12" name="TextBox 11">
                 <a:extLst>
                   <a:ext uri="{FF2B5EF4-FFF2-40B4-BE49-F238E27FC236}">
-                    <a16:creationId xmlns:a16="http://schemas.microsoft.com/office/drawing/2014/main" xmlns="" id="{1DCCE120-047F-4047-8B88-C6F0E81CCDF9}"/>
+                    <a16:creationId xmlns="" xmlns:a16="http://schemas.microsoft.com/office/drawing/2014/main" id="{1DCCE120-047F-4047-8B88-C6F0E81CCDF9}"/>
                   </a:ext>
                 </a:extLst>
               </p:cNvPr>
@@ -9115,7 +9129,7 @@
               <p:cNvPr id="13" name="TextBox 12">
                 <a:extLst>
                   <a:ext uri="{FF2B5EF4-FFF2-40B4-BE49-F238E27FC236}">
-                    <a16:creationId xmlns:a16="http://schemas.microsoft.com/office/drawing/2014/main" xmlns="" id="{BE775840-34F6-4290-BD21-FD1B27C8796F}"/>
+                    <a16:creationId xmlns="" xmlns:a16="http://schemas.microsoft.com/office/drawing/2014/main" id="{BE775840-34F6-4290-BD21-FD1B27C8796F}"/>
                   </a:ext>
                 </a:extLst>
               </p:cNvPr>
@@ -9152,7 +9166,7 @@
             <p:cNvPr id="15" name="Star: 5 Points 14">
               <a:extLst>
                 <a:ext uri="{FF2B5EF4-FFF2-40B4-BE49-F238E27FC236}">
-                  <a16:creationId xmlns:a16="http://schemas.microsoft.com/office/drawing/2014/main" xmlns="" id="{5AA1D222-D0B2-4F61-9C42-AC1D0DF1735C}"/>
+                  <a16:creationId xmlns="" xmlns:a16="http://schemas.microsoft.com/office/drawing/2014/main" id="{5AA1D222-D0B2-4F61-9C42-AC1D0DF1735C}"/>
                 </a:ext>
               </a:extLst>
             </p:cNvPr>
@@ -9198,7 +9212,7 @@
             <p:cNvPr id="17" name="Straight Arrow Connector 16">
               <a:extLst>
                 <a:ext uri="{FF2B5EF4-FFF2-40B4-BE49-F238E27FC236}">
-                  <a16:creationId xmlns:a16="http://schemas.microsoft.com/office/drawing/2014/main" xmlns="" id="{D7DD48AC-3313-49DE-9C91-B5DF4C1836FA}"/>
+                  <a16:creationId xmlns="" xmlns:a16="http://schemas.microsoft.com/office/drawing/2014/main" id="{D7DD48AC-3313-49DE-9C91-B5DF4C1836FA}"/>
                 </a:ext>
               </a:extLst>
             </p:cNvPr>
@@ -9240,7 +9254,7 @@
             <p:cNvPr id="18" name="Explosion: 8 Points 17">
               <a:extLst>
                 <a:ext uri="{FF2B5EF4-FFF2-40B4-BE49-F238E27FC236}">
-                  <a16:creationId xmlns:a16="http://schemas.microsoft.com/office/drawing/2014/main" xmlns="" id="{2B39A1D8-1B89-46CB-9904-6E4DB2E565C2}"/>
+                  <a16:creationId xmlns="" xmlns:a16="http://schemas.microsoft.com/office/drawing/2014/main" id="{2B39A1D8-1B89-46CB-9904-6E4DB2E565C2}"/>
                 </a:ext>
               </a:extLst>
             </p:cNvPr>
@@ -9294,7 +9308,7 @@
             <p:cNvPr id="19" name="TextBox 18">
               <a:extLst>
                 <a:ext uri="{FF2B5EF4-FFF2-40B4-BE49-F238E27FC236}">
-                  <a16:creationId xmlns:a16="http://schemas.microsoft.com/office/drawing/2014/main" xmlns="" id="{350D02C1-E44C-4191-B587-0B3EC392CDBF}"/>
+                  <a16:creationId xmlns="" xmlns:a16="http://schemas.microsoft.com/office/drawing/2014/main" id="{350D02C1-E44C-4191-B587-0B3EC392CDBF}"/>
                 </a:ext>
               </a:extLst>
             </p:cNvPr>
@@ -9338,7 +9352,7 @@
             <p:cNvPr id="20" name="TextBox 19">
               <a:extLst>
                 <a:ext uri="{FF2B5EF4-FFF2-40B4-BE49-F238E27FC236}">
-                  <a16:creationId xmlns:a16="http://schemas.microsoft.com/office/drawing/2014/main" xmlns="" id="{021924B3-F418-42FB-8871-CF2D44C6E42A}"/>
+                  <a16:creationId xmlns="" xmlns:a16="http://schemas.microsoft.com/office/drawing/2014/main" id="{021924B3-F418-42FB-8871-CF2D44C6E42A}"/>
                 </a:ext>
               </a:extLst>
             </p:cNvPr>
@@ -9382,7 +9396,7 @@
             <p:cNvPr id="21" name="TextBox 20">
               <a:extLst>
                 <a:ext uri="{FF2B5EF4-FFF2-40B4-BE49-F238E27FC236}">
-                  <a16:creationId xmlns:a16="http://schemas.microsoft.com/office/drawing/2014/main" xmlns="" id="{6EC244C8-5D78-4A7F-BB72-B4F6E1F68809}"/>
+                  <a16:creationId xmlns="" xmlns:a16="http://schemas.microsoft.com/office/drawing/2014/main" id="{6EC244C8-5D78-4A7F-BB72-B4F6E1F68809}"/>
                 </a:ext>
               </a:extLst>
             </p:cNvPr>
@@ -9522,7 +9536,7 @@
           <p:cNvPr id="2" name="Picture 1">
             <a:extLst>
               <a:ext uri="{FF2B5EF4-FFF2-40B4-BE49-F238E27FC236}">
-                <a16:creationId xmlns:a16="http://schemas.microsoft.com/office/drawing/2014/main" xmlns="" id="{A3D0C13E-2FAD-4B38-A8AC-86F95A177DC6}"/>
+                <a16:creationId xmlns="" xmlns:a16="http://schemas.microsoft.com/office/drawing/2014/main" id="{A3D0C13E-2FAD-4B38-A8AC-86F95A177DC6}"/>
               </a:ext>
             </a:extLst>
           </p:cNvPr>
@@ -9539,7 +9553,7 @@
         </p:blipFill>
         <p:spPr>
           <a:xfrm>
-            <a:off x="1705850" y="1009413"/>
+            <a:off x="1705850" y="1036572"/>
             <a:ext cx="8780299" cy="5424968"/>
           </a:xfrm>
           <a:prstGeom prst="rect">
@@ -9552,7 +9566,7 @@
           <p:cNvPr id="3" name="TextBox 2">
             <a:extLst>
               <a:ext uri="{FF2B5EF4-FFF2-40B4-BE49-F238E27FC236}">
-                <a16:creationId xmlns:a16="http://schemas.microsoft.com/office/drawing/2014/main" xmlns="" id="{B718B72E-6A45-486D-A67D-99311A977FFE}"/>
+                <a16:creationId xmlns="" xmlns:a16="http://schemas.microsoft.com/office/drawing/2014/main" id="{B718B72E-6A45-486D-A67D-99311A977FFE}"/>
               </a:ext>
             </a:extLst>
           </p:cNvPr>
@@ -9562,7 +9576,7 @@
         <p:spPr>
           <a:xfrm>
             <a:off x="622571" y="291830"/>
-            <a:ext cx="3948517" cy="954107"/>
+            <a:ext cx="4299575" cy="954107"/>
           </a:xfrm>
           <a:prstGeom prst="rect">
             <a:avLst/>
@@ -9576,8 +9590,20 @@
           <a:lstStyle/>
           <a:p>
             <a:r>
+              <a:rPr lang="en-US" sz="3200" b="1" dirty="0" smtClean="0">
+                <a:solidFill>
+                  <a:srgbClr val="FF0000"/>
+                </a:solidFill>
+              </a:rPr>
+              <a:t>D</a:t>
+            </a:r>
+            <a:r>
+              <a:rPr lang="en-US" sz="3200" b="1" dirty="0" smtClean="0"/>
+              <a:t> Checking </a:t>
+            </a:r>
+            <a:r>
               <a:rPr lang="en-US" sz="3200" b="1" dirty="0"/>
-              <a:t>Checking for Outliers: </a:t>
+              <a:t>for Outliers: </a:t>
             </a:r>
           </a:p>
           <a:p>

</xml_diff>